<commit_message>
Ajout du diagramme de classes
</commit_message>
<xml_diff>
--- a/UML.pptx
+++ b/UML.pptx
@@ -6,6 +6,7 @@
   </p:sldMasterIdLst>
   <p:sldIdLst>
     <p:sldId id="256" r:id="rId2"/>
+    <p:sldId id="257" r:id="rId3"/>
   </p:sldIdLst>
   <p:sldSz cx="9144000" cy="6858000" type="screen4x3"/>
   <p:notesSz cx="6858000" cy="9144000"/>
@@ -104,6 +105,11 @@
       </a:defRPr>
     </a:lvl9pPr>
   </p:defaultTextStyle>
+  <p:extLst>
+    <p:ext uri="{EFAFB233-063F-42B5-8137-9DF3F51BA10A}">
+      <p15:sldGuideLst xmlns:p15="http://schemas.microsoft.com/office/powerpoint/2012/main"/>
+    </p:ext>
+  </p:extLst>
 </p:presentation>
 </file>
 
@@ -307,280 +313,334 @@
           </ac:cxnSpMkLst>
         </pc:cxnChg>
       </pc:sldChg>
-      <pc:sldMasterChg chg="modSp modSldLayout">
-        <pc:chgData name="Martin Meneval" userId="f13fc922f159a0eb" providerId="LiveId" clId="{CD3C4527-03FB-43A6-A5CE-114DDED0F33C}" dt="2018-03-04T16:06:33.999" v="2"/>
-        <pc:sldMasterMkLst>
+    </pc:docChg>
+  </pc:docChgLst>
+  <pc:docChgLst>
+    <pc:chgData name="Martin Meneval" userId="f13fc922f159a0eb" providerId="LiveId" clId="{E3D832BD-839D-4E50-8351-99D1232E320D}"/>
+    <pc:docChg chg="custSel addSld modSld">
+      <pc:chgData name="Martin Meneval" userId="f13fc922f159a0eb" providerId="LiveId" clId="{E3D832BD-839D-4E50-8351-99D1232E320D}" dt="2018-03-11T18:14:43.948" v="3" actId="1076"/>
+      <pc:docMkLst>
+        <pc:docMk/>
+      </pc:docMkLst>
+      <pc:sldChg chg="addSp delSp modSp add">
+        <pc:chgData name="Martin Meneval" userId="f13fc922f159a0eb" providerId="LiveId" clId="{E3D832BD-839D-4E50-8351-99D1232E320D}" dt="2018-03-11T18:14:43.948" v="3" actId="1076"/>
+        <pc:sldMkLst>
           <pc:docMk/>
-          <pc:sldMasterMk cId="1877926422" sldId="2147483648"/>
-        </pc:sldMasterMkLst>
-        <pc:spChg chg="mod">
-          <ac:chgData name="Martin Meneval" userId="f13fc922f159a0eb" providerId="LiveId" clId="{CD3C4527-03FB-43A6-A5CE-114DDED0F33C}" dt="2018-03-04T16:06:33.999" v="2"/>
+          <pc:sldMk cId="153285146" sldId="257"/>
+        </pc:sldMkLst>
+        <pc:spChg chg="del">
+          <ac:chgData name="Martin Meneval" userId="f13fc922f159a0eb" providerId="LiveId" clId="{E3D832BD-839D-4E50-8351-99D1232E320D}" dt="2018-03-11T18:14:32.890" v="1" actId="478"/>
           <ac:spMkLst>
             <pc:docMk/>
-            <pc:sldMasterMk cId="1877926422" sldId="2147483648"/>
-            <ac:spMk id="2" creationId="{38F4AEB2-5E6D-49FE-9C3B-14F8A4E64443}"/>
+            <pc:sldMk cId="153285146" sldId="257"/>
+            <ac:spMk id="2" creationId="{6C696A81-A200-4BF1-A2F3-EE1BF72D8F1C}"/>
           </ac:spMkLst>
         </pc:spChg>
-        <pc:spChg chg="mod">
-          <ac:chgData name="Martin Meneval" userId="f13fc922f159a0eb" providerId="LiveId" clId="{CD3C4527-03FB-43A6-A5CE-114DDED0F33C}" dt="2018-03-04T16:06:33.999" v="2"/>
+        <pc:spChg chg="del">
+          <ac:chgData name="Martin Meneval" userId="f13fc922f159a0eb" providerId="LiveId" clId="{E3D832BD-839D-4E50-8351-99D1232E320D}" dt="2018-03-11T18:14:32.890" v="1" actId="478"/>
           <ac:spMkLst>
             <pc:docMk/>
-            <pc:sldMasterMk cId="1877926422" sldId="2147483648"/>
-            <ac:spMk id="3" creationId="{702B02D1-D963-4373-9BB8-3F826227013D}"/>
+            <pc:sldMk cId="153285146" sldId="257"/>
+            <ac:spMk id="3" creationId="{6B704587-3760-4559-8D4E-1DC8F5A991CD}"/>
           </ac:spMkLst>
         </pc:spChg>
-        <pc:spChg chg="mod">
-          <ac:chgData name="Martin Meneval" userId="f13fc922f159a0eb" providerId="LiveId" clId="{CD3C4527-03FB-43A6-A5CE-114DDED0F33C}" dt="2018-03-04T16:06:33.999" v="2"/>
+        <pc:spChg chg="add mod">
+          <ac:chgData name="Martin Meneval" userId="f13fc922f159a0eb" providerId="LiveId" clId="{E3D832BD-839D-4E50-8351-99D1232E320D}" dt="2018-03-11T18:14:43.948" v="3" actId="1076"/>
           <ac:spMkLst>
             <pc:docMk/>
-            <pc:sldMasterMk cId="1877926422" sldId="2147483648"/>
-            <ac:spMk id="4" creationId="{24F372DF-23F0-484A-A16A-A5C4BA5CB08C}"/>
+            <pc:sldMk cId="153285146" sldId="257"/>
+            <ac:spMk id="4" creationId="{11ABAF8A-93D5-4A6F-B3F9-61AB85862A12}"/>
           </ac:spMkLst>
         </pc:spChg>
-        <pc:spChg chg="mod">
-          <ac:chgData name="Martin Meneval" userId="f13fc922f159a0eb" providerId="LiveId" clId="{CD3C4527-03FB-43A6-A5CE-114DDED0F33C}" dt="2018-03-04T16:06:33.999" v="2"/>
+        <pc:spChg chg="add mod">
+          <ac:chgData name="Martin Meneval" userId="f13fc922f159a0eb" providerId="LiveId" clId="{E3D832BD-839D-4E50-8351-99D1232E320D}" dt="2018-03-11T18:14:43.948" v="3" actId="1076"/>
           <ac:spMkLst>
             <pc:docMk/>
-            <pc:sldMasterMk cId="1877926422" sldId="2147483648"/>
-            <ac:spMk id="5" creationId="{BAA1446E-ACBB-4310-9B7B-9CD5CC8F1505}"/>
+            <pc:sldMk cId="153285146" sldId="257"/>
+            <ac:spMk id="5" creationId="{68125A1F-1C85-4146-B93B-F898CDFC76E6}"/>
           </ac:spMkLst>
         </pc:spChg>
-        <pc:spChg chg="mod">
-          <ac:chgData name="Martin Meneval" userId="f13fc922f159a0eb" providerId="LiveId" clId="{CD3C4527-03FB-43A6-A5CE-114DDED0F33C}" dt="2018-03-04T16:06:33.999" v="2"/>
+        <pc:spChg chg="add mod">
+          <ac:chgData name="Martin Meneval" userId="f13fc922f159a0eb" providerId="LiveId" clId="{E3D832BD-839D-4E50-8351-99D1232E320D}" dt="2018-03-11T18:14:43.948" v="3" actId="1076"/>
           <ac:spMkLst>
             <pc:docMk/>
-            <pc:sldMasterMk cId="1877926422" sldId="2147483648"/>
-            <ac:spMk id="6" creationId="{0DB71F9C-A5D7-4DD7-8294-54E40E9F20DD}"/>
+            <pc:sldMk cId="153285146" sldId="257"/>
+            <ac:spMk id="6" creationId="{58C67432-B851-4113-A405-04B96F9C0624}"/>
           </ac:spMkLst>
         </pc:spChg>
-        <pc:sldLayoutChg chg="modSp">
-          <pc:chgData name="Martin Meneval" userId="f13fc922f159a0eb" providerId="LiveId" clId="{CD3C4527-03FB-43A6-A5CE-114DDED0F33C}" dt="2018-03-04T16:06:33.999" v="2"/>
-          <pc:sldLayoutMkLst>
+        <pc:spChg chg="add mod">
+          <ac:chgData name="Martin Meneval" userId="f13fc922f159a0eb" providerId="LiveId" clId="{E3D832BD-839D-4E50-8351-99D1232E320D}" dt="2018-03-11T18:14:43.948" v="3" actId="1076"/>
+          <ac:spMkLst>
             <pc:docMk/>
-            <pc:sldMasterMk cId="1877926422" sldId="2147483648"/>
-            <pc:sldLayoutMk cId="3664347203" sldId="2147483649"/>
-          </pc:sldLayoutMkLst>
-          <pc:spChg chg="mod">
-            <ac:chgData name="Martin Meneval" userId="f13fc922f159a0eb" providerId="LiveId" clId="{CD3C4527-03FB-43A6-A5CE-114DDED0F33C}" dt="2018-03-04T16:06:33.999" v="2"/>
-            <ac:spMkLst>
-              <pc:docMk/>
-              <pc:sldMasterMk cId="1877926422" sldId="2147483648"/>
-              <pc:sldLayoutMk cId="3664347203" sldId="2147483649"/>
-              <ac:spMk id="2" creationId="{072B8472-8732-4E3A-9B5D-1EBD0CEEDA3F}"/>
-            </ac:spMkLst>
-          </pc:spChg>
-          <pc:spChg chg="mod">
-            <ac:chgData name="Martin Meneval" userId="f13fc922f159a0eb" providerId="LiveId" clId="{CD3C4527-03FB-43A6-A5CE-114DDED0F33C}" dt="2018-03-04T16:06:33.999" v="2"/>
-            <ac:spMkLst>
-              <pc:docMk/>
-              <pc:sldMasterMk cId="1877926422" sldId="2147483648"/>
-              <pc:sldLayoutMk cId="3664347203" sldId="2147483649"/>
-              <ac:spMk id="3" creationId="{EBA6A136-6B0A-4BC1-9FCA-C217FD99BF89}"/>
-            </ac:spMkLst>
-          </pc:spChg>
-        </pc:sldLayoutChg>
-        <pc:sldLayoutChg chg="modSp">
-          <pc:chgData name="Martin Meneval" userId="f13fc922f159a0eb" providerId="LiveId" clId="{CD3C4527-03FB-43A6-A5CE-114DDED0F33C}" dt="2018-03-04T16:06:33.999" v="2"/>
-          <pc:sldLayoutMkLst>
+            <pc:sldMk cId="153285146" sldId="257"/>
+            <ac:spMk id="7" creationId="{42CA8282-F98B-4529-A445-642BA1BD4C8F}"/>
+          </ac:spMkLst>
+        </pc:spChg>
+        <pc:spChg chg="add mod">
+          <ac:chgData name="Martin Meneval" userId="f13fc922f159a0eb" providerId="LiveId" clId="{E3D832BD-839D-4E50-8351-99D1232E320D}" dt="2018-03-11T18:14:43.948" v="3" actId="1076"/>
+          <ac:spMkLst>
             <pc:docMk/>
-            <pc:sldMasterMk cId="1877926422" sldId="2147483648"/>
-            <pc:sldLayoutMk cId="2729582050" sldId="2147483651"/>
-          </pc:sldLayoutMkLst>
-          <pc:spChg chg="mod">
-            <ac:chgData name="Martin Meneval" userId="f13fc922f159a0eb" providerId="LiveId" clId="{CD3C4527-03FB-43A6-A5CE-114DDED0F33C}" dt="2018-03-04T16:06:33.999" v="2"/>
-            <ac:spMkLst>
-              <pc:docMk/>
-              <pc:sldMasterMk cId="1877926422" sldId="2147483648"/>
-              <pc:sldLayoutMk cId="2729582050" sldId="2147483651"/>
-              <ac:spMk id="2" creationId="{EEE19DB3-C3F5-4635-B46E-034541E38F6D}"/>
-            </ac:spMkLst>
-          </pc:spChg>
-          <pc:spChg chg="mod">
-            <ac:chgData name="Martin Meneval" userId="f13fc922f159a0eb" providerId="LiveId" clId="{CD3C4527-03FB-43A6-A5CE-114DDED0F33C}" dt="2018-03-04T16:06:33.999" v="2"/>
-            <ac:spMkLst>
-              <pc:docMk/>
-              <pc:sldMasterMk cId="1877926422" sldId="2147483648"/>
-              <pc:sldLayoutMk cId="2729582050" sldId="2147483651"/>
-              <ac:spMk id="3" creationId="{01829E7B-BD80-4B08-B678-F30A07E87D87}"/>
-            </ac:spMkLst>
-          </pc:spChg>
-        </pc:sldLayoutChg>
-        <pc:sldLayoutChg chg="modSp">
-          <pc:chgData name="Martin Meneval" userId="f13fc922f159a0eb" providerId="LiveId" clId="{CD3C4527-03FB-43A6-A5CE-114DDED0F33C}" dt="2018-03-04T16:06:33.999" v="2"/>
-          <pc:sldLayoutMkLst>
+            <pc:sldMk cId="153285146" sldId="257"/>
+            <ac:spMk id="8" creationId="{8E128D06-87DE-4282-86F7-A978728C2C70}"/>
+          </ac:spMkLst>
+        </pc:spChg>
+        <pc:spChg chg="add mod">
+          <ac:chgData name="Martin Meneval" userId="f13fc922f159a0eb" providerId="LiveId" clId="{E3D832BD-839D-4E50-8351-99D1232E320D}" dt="2018-03-11T18:14:43.948" v="3" actId="1076"/>
+          <ac:spMkLst>
             <pc:docMk/>
-            <pc:sldMasterMk cId="1877926422" sldId="2147483648"/>
-            <pc:sldLayoutMk cId="1230963630" sldId="2147483652"/>
-          </pc:sldLayoutMkLst>
-          <pc:spChg chg="mod">
-            <ac:chgData name="Martin Meneval" userId="f13fc922f159a0eb" providerId="LiveId" clId="{CD3C4527-03FB-43A6-A5CE-114DDED0F33C}" dt="2018-03-04T16:06:33.999" v="2"/>
-            <ac:spMkLst>
-              <pc:docMk/>
-              <pc:sldMasterMk cId="1877926422" sldId="2147483648"/>
-              <pc:sldLayoutMk cId="1230963630" sldId="2147483652"/>
-              <ac:spMk id="3" creationId="{9840DDFF-C343-4C2F-A23F-8A93D853EC56}"/>
-            </ac:spMkLst>
-          </pc:spChg>
-          <pc:spChg chg="mod">
-            <ac:chgData name="Martin Meneval" userId="f13fc922f159a0eb" providerId="LiveId" clId="{CD3C4527-03FB-43A6-A5CE-114DDED0F33C}" dt="2018-03-04T16:06:33.999" v="2"/>
-            <ac:spMkLst>
-              <pc:docMk/>
-              <pc:sldMasterMk cId="1877926422" sldId="2147483648"/>
-              <pc:sldLayoutMk cId="1230963630" sldId="2147483652"/>
-              <ac:spMk id="4" creationId="{F85191EB-E937-43EC-A442-CA70595CE921}"/>
-            </ac:spMkLst>
-          </pc:spChg>
-        </pc:sldLayoutChg>
-        <pc:sldLayoutChg chg="modSp">
-          <pc:chgData name="Martin Meneval" userId="f13fc922f159a0eb" providerId="LiveId" clId="{CD3C4527-03FB-43A6-A5CE-114DDED0F33C}" dt="2018-03-04T16:06:33.999" v="2"/>
-          <pc:sldLayoutMkLst>
+            <pc:sldMk cId="153285146" sldId="257"/>
+            <ac:spMk id="9" creationId="{3FD9AAE9-1A6C-4624-9A77-29BD929DCE1F}"/>
+          </ac:spMkLst>
+        </pc:spChg>
+        <pc:spChg chg="add mod">
+          <ac:chgData name="Martin Meneval" userId="f13fc922f159a0eb" providerId="LiveId" clId="{E3D832BD-839D-4E50-8351-99D1232E320D}" dt="2018-03-11T18:14:43.948" v="3" actId="1076"/>
+          <ac:spMkLst>
             <pc:docMk/>
-            <pc:sldMasterMk cId="1877926422" sldId="2147483648"/>
-            <pc:sldLayoutMk cId="3875193522" sldId="2147483653"/>
-          </pc:sldLayoutMkLst>
-          <pc:spChg chg="mod">
-            <ac:chgData name="Martin Meneval" userId="f13fc922f159a0eb" providerId="LiveId" clId="{CD3C4527-03FB-43A6-A5CE-114DDED0F33C}" dt="2018-03-04T16:06:33.999" v="2"/>
-            <ac:spMkLst>
-              <pc:docMk/>
-              <pc:sldMasterMk cId="1877926422" sldId="2147483648"/>
-              <pc:sldLayoutMk cId="3875193522" sldId="2147483653"/>
-              <ac:spMk id="2" creationId="{AE3F02F8-0B90-43AA-BFB6-35296A7DC594}"/>
-            </ac:spMkLst>
-          </pc:spChg>
-          <pc:spChg chg="mod">
-            <ac:chgData name="Martin Meneval" userId="f13fc922f159a0eb" providerId="LiveId" clId="{CD3C4527-03FB-43A6-A5CE-114DDED0F33C}" dt="2018-03-04T16:06:33.999" v="2"/>
-            <ac:spMkLst>
-              <pc:docMk/>
-              <pc:sldMasterMk cId="1877926422" sldId="2147483648"/>
-              <pc:sldLayoutMk cId="3875193522" sldId="2147483653"/>
-              <ac:spMk id="3" creationId="{0FBC3E8B-C802-4A21-87A8-569AE9490A79}"/>
-            </ac:spMkLst>
-          </pc:spChg>
-          <pc:spChg chg="mod">
-            <ac:chgData name="Martin Meneval" userId="f13fc922f159a0eb" providerId="LiveId" clId="{CD3C4527-03FB-43A6-A5CE-114DDED0F33C}" dt="2018-03-04T16:06:33.999" v="2"/>
-            <ac:spMkLst>
-              <pc:docMk/>
-              <pc:sldMasterMk cId="1877926422" sldId="2147483648"/>
-              <pc:sldLayoutMk cId="3875193522" sldId="2147483653"/>
-              <ac:spMk id="4" creationId="{CF8AE65C-3C98-439B-9A3B-01100A0E119A}"/>
-            </ac:spMkLst>
-          </pc:spChg>
-          <pc:spChg chg="mod">
-            <ac:chgData name="Martin Meneval" userId="f13fc922f159a0eb" providerId="LiveId" clId="{CD3C4527-03FB-43A6-A5CE-114DDED0F33C}" dt="2018-03-04T16:06:33.999" v="2"/>
-            <ac:spMkLst>
-              <pc:docMk/>
-              <pc:sldMasterMk cId="1877926422" sldId="2147483648"/>
-              <pc:sldLayoutMk cId="3875193522" sldId="2147483653"/>
-              <ac:spMk id="5" creationId="{BF119107-683E-405D-8EC1-4F889F276B44}"/>
-            </ac:spMkLst>
-          </pc:spChg>
-          <pc:spChg chg="mod">
-            <ac:chgData name="Martin Meneval" userId="f13fc922f159a0eb" providerId="LiveId" clId="{CD3C4527-03FB-43A6-A5CE-114DDED0F33C}" dt="2018-03-04T16:06:33.999" v="2"/>
-            <ac:spMkLst>
-              <pc:docMk/>
-              <pc:sldMasterMk cId="1877926422" sldId="2147483648"/>
-              <pc:sldLayoutMk cId="3875193522" sldId="2147483653"/>
-              <ac:spMk id="6" creationId="{5F7CF529-EEAA-4343-8160-0A01E75857AD}"/>
-            </ac:spMkLst>
-          </pc:spChg>
-        </pc:sldLayoutChg>
-        <pc:sldLayoutChg chg="modSp">
-          <pc:chgData name="Martin Meneval" userId="f13fc922f159a0eb" providerId="LiveId" clId="{CD3C4527-03FB-43A6-A5CE-114DDED0F33C}" dt="2018-03-04T16:06:33.999" v="2"/>
-          <pc:sldLayoutMkLst>
+            <pc:sldMk cId="153285146" sldId="257"/>
+            <ac:spMk id="10" creationId="{F646CDD0-5789-461A-A1E2-C629D58FE517}"/>
+          </ac:spMkLst>
+        </pc:spChg>
+        <pc:spChg chg="add mod">
+          <ac:chgData name="Martin Meneval" userId="f13fc922f159a0eb" providerId="LiveId" clId="{E3D832BD-839D-4E50-8351-99D1232E320D}" dt="2018-03-11T18:14:43.948" v="3" actId="1076"/>
+          <ac:spMkLst>
             <pc:docMk/>
-            <pc:sldMasterMk cId="1877926422" sldId="2147483648"/>
-            <pc:sldLayoutMk cId="1065339812" sldId="2147483656"/>
-          </pc:sldLayoutMkLst>
-          <pc:spChg chg="mod">
-            <ac:chgData name="Martin Meneval" userId="f13fc922f159a0eb" providerId="LiveId" clId="{CD3C4527-03FB-43A6-A5CE-114DDED0F33C}" dt="2018-03-04T16:06:33.999" v="2"/>
-            <ac:spMkLst>
-              <pc:docMk/>
-              <pc:sldMasterMk cId="1877926422" sldId="2147483648"/>
-              <pc:sldLayoutMk cId="1065339812" sldId="2147483656"/>
-              <ac:spMk id="2" creationId="{02068001-E84B-40FA-88F3-29A1EE677DCC}"/>
-            </ac:spMkLst>
-          </pc:spChg>
-          <pc:spChg chg="mod">
-            <ac:chgData name="Martin Meneval" userId="f13fc922f159a0eb" providerId="LiveId" clId="{CD3C4527-03FB-43A6-A5CE-114DDED0F33C}" dt="2018-03-04T16:06:33.999" v="2"/>
-            <ac:spMkLst>
-              <pc:docMk/>
-              <pc:sldMasterMk cId="1877926422" sldId="2147483648"/>
-              <pc:sldLayoutMk cId="1065339812" sldId="2147483656"/>
-              <ac:spMk id="3" creationId="{837E7BEE-4E84-4086-882E-CA78B00434F5}"/>
-            </ac:spMkLst>
-          </pc:spChg>
-          <pc:spChg chg="mod">
-            <ac:chgData name="Martin Meneval" userId="f13fc922f159a0eb" providerId="LiveId" clId="{CD3C4527-03FB-43A6-A5CE-114DDED0F33C}" dt="2018-03-04T16:06:33.999" v="2"/>
-            <ac:spMkLst>
-              <pc:docMk/>
-              <pc:sldMasterMk cId="1877926422" sldId="2147483648"/>
-              <pc:sldLayoutMk cId="1065339812" sldId="2147483656"/>
-              <ac:spMk id="4" creationId="{CEA6EB73-D5A3-47AE-AFED-4DA7367AE74F}"/>
-            </ac:spMkLst>
-          </pc:spChg>
-        </pc:sldLayoutChg>
-        <pc:sldLayoutChg chg="modSp">
-          <pc:chgData name="Martin Meneval" userId="f13fc922f159a0eb" providerId="LiveId" clId="{CD3C4527-03FB-43A6-A5CE-114DDED0F33C}" dt="2018-03-04T16:06:33.999" v="2"/>
-          <pc:sldLayoutMkLst>
+            <pc:sldMk cId="153285146" sldId="257"/>
+            <ac:spMk id="11" creationId="{9CA5A51D-96E9-422B-824B-C20379AE0451}"/>
+          </ac:spMkLst>
+        </pc:spChg>
+        <pc:spChg chg="add mod">
+          <ac:chgData name="Martin Meneval" userId="f13fc922f159a0eb" providerId="LiveId" clId="{E3D832BD-839D-4E50-8351-99D1232E320D}" dt="2018-03-11T18:14:43.948" v="3" actId="1076"/>
+          <ac:spMkLst>
             <pc:docMk/>
-            <pc:sldMasterMk cId="1877926422" sldId="2147483648"/>
-            <pc:sldLayoutMk cId="3214609798" sldId="2147483657"/>
-          </pc:sldLayoutMkLst>
-          <pc:spChg chg="mod">
-            <ac:chgData name="Martin Meneval" userId="f13fc922f159a0eb" providerId="LiveId" clId="{CD3C4527-03FB-43A6-A5CE-114DDED0F33C}" dt="2018-03-04T16:06:33.999" v="2"/>
-            <ac:spMkLst>
-              <pc:docMk/>
-              <pc:sldMasterMk cId="1877926422" sldId="2147483648"/>
-              <pc:sldLayoutMk cId="3214609798" sldId="2147483657"/>
-              <ac:spMk id="2" creationId="{1D98E1BE-DDD8-4BEB-AA56-D609D0140D60}"/>
-            </ac:spMkLst>
-          </pc:spChg>
-          <pc:spChg chg="mod">
-            <ac:chgData name="Martin Meneval" userId="f13fc922f159a0eb" providerId="LiveId" clId="{CD3C4527-03FB-43A6-A5CE-114DDED0F33C}" dt="2018-03-04T16:06:33.999" v="2"/>
-            <ac:spMkLst>
-              <pc:docMk/>
-              <pc:sldMasterMk cId="1877926422" sldId="2147483648"/>
-              <pc:sldLayoutMk cId="3214609798" sldId="2147483657"/>
-              <ac:spMk id="3" creationId="{45B2EC99-954B-4474-8B9C-4089DA79E2EA}"/>
-            </ac:spMkLst>
-          </pc:spChg>
-          <pc:spChg chg="mod">
-            <ac:chgData name="Martin Meneval" userId="f13fc922f159a0eb" providerId="LiveId" clId="{CD3C4527-03FB-43A6-A5CE-114DDED0F33C}" dt="2018-03-04T16:06:33.999" v="2"/>
-            <ac:spMkLst>
-              <pc:docMk/>
-              <pc:sldMasterMk cId="1877926422" sldId="2147483648"/>
-              <pc:sldLayoutMk cId="3214609798" sldId="2147483657"/>
-              <ac:spMk id="4" creationId="{289A473A-90B6-41EB-8D96-9548867A7042}"/>
-            </ac:spMkLst>
-          </pc:spChg>
-        </pc:sldLayoutChg>
-        <pc:sldLayoutChg chg="modSp">
-          <pc:chgData name="Martin Meneval" userId="f13fc922f159a0eb" providerId="LiveId" clId="{CD3C4527-03FB-43A6-A5CE-114DDED0F33C}" dt="2018-03-04T16:06:33.999" v="2"/>
-          <pc:sldLayoutMkLst>
+            <pc:sldMk cId="153285146" sldId="257"/>
+            <ac:spMk id="12" creationId="{C5921BA8-AA03-402B-83C5-452B1B88DE0F}"/>
+          </ac:spMkLst>
+        </pc:spChg>
+        <pc:spChg chg="add mod">
+          <ac:chgData name="Martin Meneval" userId="f13fc922f159a0eb" providerId="LiveId" clId="{E3D832BD-839D-4E50-8351-99D1232E320D}" dt="2018-03-11T18:14:43.948" v="3" actId="1076"/>
+          <ac:spMkLst>
             <pc:docMk/>
-            <pc:sldMasterMk cId="1877926422" sldId="2147483648"/>
-            <pc:sldLayoutMk cId="3371820051" sldId="2147483659"/>
-          </pc:sldLayoutMkLst>
-          <pc:spChg chg="mod">
-            <ac:chgData name="Martin Meneval" userId="f13fc922f159a0eb" providerId="LiveId" clId="{CD3C4527-03FB-43A6-A5CE-114DDED0F33C}" dt="2018-03-04T16:06:33.999" v="2"/>
-            <ac:spMkLst>
-              <pc:docMk/>
-              <pc:sldMasterMk cId="1877926422" sldId="2147483648"/>
-              <pc:sldLayoutMk cId="3371820051" sldId="2147483659"/>
-              <ac:spMk id="2" creationId="{090760ED-139A-4350-8D8D-D8DB8D9FBB86}"/>
-            </ac:spMkLst>
-          </pc:spChg>
-          <pc:spChg chg="mod">
-            <ac:chgData name="Martin Meneval" userId="f13fc922f159a0eb" providerId="LiveId" clId="{CD3C4527-03FB-43A6-A5CE-114DDED0F33C}" dt="2018-03-04T16:06:33.999" v="2"/>
-            <ac:spMkLst>
-              <pc:docMk/>
-              <pc:sldMasterMk cId="1877926422" sldId="2147483648"/>
-              <pc:sldLayoutMk cId="3371820051" sldId="2147483659"/>
-              <ac:spMk id="3" creationId="{C3104BEC-354C-47EC-BB18-2230E16189A5}"/>
-            </ac:spMkLst>
-          </pc:spChg>
-        </pc:sldLayoutChg>
-      </pc:sldMasterChg>
+            <pc:sldMk cId="153285146" sldId="257"/>
+            <ac:spMk id="13" creationId="{C41EA2EE-790B-43C1-ABDB-5CAA46E22D92}"/>
+          </ac:spMkLst>
+        </pc:spChg>
+        <pc:spChg chg="add mod">
+          <ac:chgData name="Martin Meneval" userId="f13fc922f159a0eb" providerId="LiveId" clId="{E3D832BD-839D-4E50-8351-99D1232E320D}" dt="2018-03-11T18:14:43.948" v="3" actId="1076"/>
+          <ac:spMkLst>
+            <pc:docMk/>
+            <pc:sldMk cId="153285146" sldId="257"/>
+            <ac:spMk id="14" creationId="{C47FFEE6-1CC6-4BF2-8F43-4EBA34752712}"/>
+          </ac:spMkLst>
+        </pc:spChg>
+        <pc:spChg chg="add mod">
+          <ac:chgData name="Martin Meneval" userId="f13fc922f159a0eb" providerId="LiveId" clId="{E3D832BD-839D-4E50-8351-99D1232E320D}" dt="2018-03-11T18:14:43.948" v="3" actId="1076"/>
+          <ac:spMkLst>
+            <pc:docMk/>
+            <pc:sldMk cId="153285146" sldId="257"/>
+            <ac:spMk id="15" creationId="{71673987-BCDE-4AA7-BEE7-78AC11320DCF}"/>
+          </ac:spMkLst>
+        </pc:spChg>
+        <pc:spChg chg="add mod">
+          <ac:chgData name="Martin Meneval" userId="f13fc922f159a0eb" providerId="LiveId" clId="{E3D832BD-839D-4E50-8351-99D1232E320D}" dt="2018-03-11T18:14:43.948" v="3" actId="1076"/>
+          <ac:spMkLst>
+            <pc:docMk/>
+            <pc:sldMk cId="153285146" sldId="257"/>
+            <ac:spMk id="16" creationId="{11B10CDD-4D1F-4D77-81E4-1A7C266F7C0E}"/>
+          </ac:spMkLst>
+        </pc:spChg>
+        <pc:spChg chg="add mod">
+          <ac:chgData name="Martin Meneval" userId="f13fc922f159a0eb" providerId="LiveId" clId="{E3D832BD-839D-4E50-8351-99D1232E320D}" dt="2018-03-11T18:14:43.948" v="3" actId="1076"/>
+          <ac:spMkLst>
+            <pc:docMk/>
+            <pc:sldMk cId="153285146" sldId="257"/>
+            <ac:spMk id="17" creationId="{DBE96A30-7256-4B08-A664-4E977D991D73}"/>
+          </ac:spMkLst>
+        </pc:spChg>
+        <pc:spChg chg="add mod">
+          <ac:chgData name="Martin Meneval" userId="f13fc922f159a0eb" providerId="LiveId" clId="{E3D832BD-839D-4E50-8351-99D1232E320D}" dt="2018-03-11T18:14:43.948" v="3" actId="1076"/>
+          <ac:spMkLst>
+            <pc:docMk/>
+            <pc:sldMk cId="153285146" sldId="257"/>
+            <ac:spMk id="18" creationId="{F874710D-6F78-4BAD-9B26-D746E270C82C}"/>
+          </ac:spMkLst>
+        </pc:spChg>
+        <pc:spChg chg="add mod">
+          <ac:chgData name="Martin Meneval" userId="f13fc922f159a0eb" providerId="LiveId" clId="{E3D832BD-839D-4E50-8351-99D1232E320D}" dt="2018-03-11T18:14:43.948" v="3" actId="1076"/>
+          <ac:spMkLst>
+            <pc:docMk/>
+            <pc:sldMk cId="153285146" sldId="257"/>
+            <ac:spMk id="19" creationId="{41853B23-2D74-4544-9224-CE7881CA2AB2}"/>
+          </ac:spMkLst>
+        </pc:spChg>
+        <pc:spChg chg="add mod">
+          <ac:chgData name="Martin Meneval" userId="f13fc922f159a0eb" providerId="LiveId" clId="{E3D832BD-839D-4E50-8351-99D1232E320D}" dt="2018-03-11T18:14:43.948" v="3" actId="1076"/>
+          <ac:spMkLst>
+            <pc:docMk/>
+            <pc:sldMk cId="153285146" sldId="257"/>
+            <ac:spMk id="20" creationId="{45B386CF-43F6-40C3-B19C-B9F8CD7A6527}"/>
+          </ac:spMkLst>
+        </pc:spChg>
+        <pc:spChg chg="add mod">
+          <ac:chgData name="Martin Meneval" userId="f13fc922f159a0eb" providerId="LiveId" clId="{E3D832BD-839D-4E50-8351-99D1232E320D}" dt="2018-03-11T18:14:43.948" v="3" actId="1076"/>
+          <ac:spMkLst>
+            <pc:docMk/>
+            <pc:sldMk cId="153285146" sldId="257"/>
+            <ac:spMk id="21" creationId="{EA630C2C-B8CF-482C-9293-3938DFED7186}"/>
+          </ac:spMkLst>
+        </pc:spChg>
+        <pc:spChg chg="add mod">
+          <ac:chgData name="Martin Meneval" userId="f13fc922f159a0eb" providerId="LiveId" clId="{E3D832BD-839D-4E50-8351-99D1232E320D}" dt="2018-03-11T18:14:43.948" v="3" actId="1076"/>
+          <ac:spMkLst>
+            <pc:docMk/>
+            <pc:sldMk cId="153285146" sldId="257"/>
+            <ac:spMk id="22" creationId="{05BF7FCF-F302-4CF2-B729-53C33DBECCC3}"/>
+          </ac:spMkLst>
+        </pc:spChg>
+        <pc:spChg chg="add mod">
+          <ac:chgData name="Martin Meneval" userId="f13fc922f159a0eb" providerId="LiveId" clId="{E3D832BD-839D-4E50-8351-99D1232E320D}" dt="2018-03-11T18:14:43.948" v="3" actId="1076"/>
+          <ac:spMkLst>
+            <pc:docMk/>
+            <pc:sldMk cId="153285146" sldId="257"/>
+            <ac:spMk id="23" creationId="{1F6BF0D6-D3E1-4426-B065-0D405E263B79}"/>
+          </ac:spMkLst>
+        </pc:spChg>
+        <pc:spChg chg="add mod">
+          <ac:chgData name="Martin Meneval" userId="f13fc922f159a0eb" providerId="LiveId" clId="{E3D832BD-839D-4E50-8351-99D1232E320D}" dt="2018-03-11T18:14:43.948" v="3" actId="1076"/>
+          <ac:spMkLst>
+            <pc:docMk/>
+            <pc:sldMk cId="153285146" sldId="257"/>
+            <ac:spMk id="24" creationId="{56094E21-61CE-44C4-8408-900F2D00E832}"/>
+          </ac:spMkLst>
+        </pc:spChg>
+        <pc:spChg chg="add mod">
+          <ac:chgData name="Martin Meneval" userId="f13fc922f159a0eb" providerId="LiveId" clId="{E3D832BD-839D-4E50-8351-99D1232E320D}" dt="2018-03-11T18:14:43.948" v="3" actId="1076"/>
+          <ac:spMkLst>
+            <pc:docMk/>
+            <pc:sldMk cId="153285146" sldId="257"/>
+            <ac:spMk id="25" creationId="{8F6A275A-FEB8-4CE1-B0AA-CE6E26EF9934}"/>
+          </ac:spMkLst>
+        </pc:spChg>
+        <pc:spChg chg="add mod">
+          <ac:chgData name="Martin Meneval" userId="f13fc922f159a0eb" providerId="LiveId" clId="{E3D832BD-839D-4E50-8351-99D1232E320D}" dt="2018-03-11T18:14:43.948" v="3" actId="1076"/>
+          <ac:spMkLst>
+            <pc:docMk/>
+            <pc:sldMk cId="153285146" sldId="257"/>
+            <ac:spMk id="26" creationId="{FF9BD744-4BCB-4A1C-93DA-A1749C0641DC}"/>
+          </ac:spMkLst>
+        </pc:spChg>
+        <pc:spChg chg="add mod">
+          <ac:chgData name="Martin Meneval" userId="f13fc922f159a0eb" providerId="LiveId" clId="{E3D832BD-839D-4E50-8351-99D1232E320D}" dt="2018-03-11T18:14:43.948" v="3" actId="1076"/>
+          <ac:spMkLst>
+            <pc:docMk/>
+            <pc:sldMk cId="153285146" sldId="257"/>
+            <ac:spMk id="27" creationId="{D0C21860-38E5-4CC1-88DC-AC1D76899401}"/>
+          </ac:spMkLst>
+        </pc:spChg>
+        <pc:spChg chg="add mod">
+          <ac:chgData name="Martin Meneval" userId="f13fc922f159a0eb" providerId="LiveId" clId="{E3D832BD-839D-4E50-8351-99D1232E320D}" dt="2018-03-11T18:14:43.948" v="3" actId="1076"/>
+          <ac:spMkLst>
+            <pc:docMk/>
+            <pc:sldMk cId="153285146" sldId="257"/>
+            <ac:spMk id="28" creationId="{9A400240-B271-4E4B-85F7-5CF7946EF0A4}"/>
+          </ac:spMkLst>
+        </pc:spChg>
+        <pc:spChg chg="add mod">
+          <ac:chgData name="Martin Meneval" userId="f13fc922f159a0eb" providerId="LiveId" clId="{E3D832BD-839D-4E50-8351-99D1232E320D}" dt="2018-03-11T18:14:43.948" v="3" actId="1076"/>
+          <ac:spMkLst>
+            <pc:docMk/>
+            <pc:sldMk cId="153285146" sldId="257"/>
+            <ac:spMk id="29" creationId="{AFC59DD5-0DD7-4366-833D-E77B5C2C74E5}"/>
+          </ac:spMkLst>
+        </pc:spChg>
+        <pc:spChg chg="add mod">
+          <ac:chgData name="Martin Meneval" userId="f13fc922f159a0eb" providerId="LiveId" clId="{E3D832BD-839D-4E50-8351-99D1232E320D}" dt="2018-03-11T18:14:43.948" v="3" actId="1076"/>
+          <ac:spMkLst>
+            <pc:docMk/>
+            <pc:sldMk cId="153285146" sldId="257"/>
+            <ac:spMk id="30" creationId="{B5E0EB88-24A1-4B0E-A211-961F3194402E}"/>
+          </ac:spMkLst>
+        </pc:spChg>
+        <pc:spChg chg="add mod">
+          <ac:chgData name="Martin Meneval" userId="f13fc922f159a0eb" providerId="LiveId" clId="{E3D832BD-839D-4E50-8351-99D1232E320D}" dt="2018-03-11T18:14:43.948" v="3" actId="1076"/>
+          <ac:spMkLst>
+            <pc:docMk/>
+            <pc:sldMk cId="153285146" sldId="257"/>
+            <ac:spMk id="31" creationId="{1D6E80A6-DAB2-45D1-B749-1F00B0FF4F03}"/>
+          </ac:spMkLst>
+        </pc:spChg>
+        <pc:spChg chg="add mod">
+          <ac:chgData name="Martin Meneval" userId="f13fc922f159a0eb" providerId="LiveId" clId="{E3D832BD-839D-4E50-8351-99D1232E320D}" dt="2018-03-11T18:14:43.948" v="3" actId="1076"/>
+          <ac:spMkLst>
+            <pc:docMk/>
+            <pc:sldMk cId="153285146" sldId="257"/>
+            <ac:spMk id="32" creationId="{696F0062-4E3D-4E6E-9DD4-860B85D46351}"/>
+          </ac:spMkLst>
+        </pc:spChg>
+        <pc:spChg chg="add mod">
+          <ac:chgData name="Martin Meneval" userId="f13fc922f159a0eb" providerId="LiveId" clId="{E3D832BD-839D-4E50-8351-99D1232E320D}" dt="2018-03-11T18:14:43.948" v="3" actId="1076"/>
+          <ac:spMkLst>
+            <pc:docMk/>
+            <pc:sldMk cId="153285146" sldId="257"/>
+            <ac:spMk id="33" creationId="{7321B02B-A3E4-4DBD-88EA-8C08F7479573}"/>
+          </ac:spMkLst>
+        </pc:spChg>
+        <pc:spChg chg="add mod">
+          <ac:chgData name="Martin Meneval" userId="f13fc922f159a0eb" providerId="LiveId" clId="{E3D832BD-839D-4E50-8351-99D1232E320D}" dt="2018-03-11T18:14:43.948" v="3" actId="1076"/>
+          <ac:spMkLst>
+            <pc:docMk/>
+            <pc:sldMk cId="153285146" sldId="257"/>
+            <ac:spMk id="34" creationId="{DCC784E5-F420-43C0-839F-C65774D995F0}"/>
+          </ac:spMkLst>
+        </pc:spChg>
+        <pc:spChg chg="add mod">
+          <ac:chgData name="Martin Meneval" userId="f13fc922f159a0eb" providerId="LiveId" clId="{E3D832BD-839D-4E50-8351-99D1232E320D}" dt="2018-03-11T18:14:43.948" v="3" actId="1076"/>
+          <ac:spMkLst>
+            <pc:docMk/>
+            <pc:sldMk cId="153285146" sldId="257"/>
+            <ac:spMk id="35" creationId="{064AC85F-42D3-4D38-83E5-5CC16BBE51B0}"/>
+          </ac:spMkLst>
+        </pc:spChg>
+        <pc:cxnChg chg="add mod">
+          <ac:chgData name="Martin Meneval" userId="f13fc922f159a0eb" providerId="LiveId" clId="{E3D832BD-839D-4E50-8351-99D1232E320D}" dt="2018-03-11T18:14:43.948" v="3" actId="1076"/>
+          <ac:cxnSpMkLst>
+            <pc:docMk/>
+            <pc:sldMk cId="153285146" sldId="257"/>
+            <ac:cxnSpMk id="36" creationId="{6C45664D-9E64-423E-8A60-AE2D526D9756}"/>
+          </ac:cxnSpMkLst>
+        </pc:cxnChg>
+        <pc:cxnChg chg="add mod">
+          <ac:chgData name="Martin Meneval" userId="f13fc922f159a0eb" providerId="LiveId" clId="{E3D832BD-839D-4E50-8351-99D1232E320D}" dt="2018-03-11T18:14:43.948" v="3" actId="1076"/>
+          <ac:cxnSpMkLst>
+            <pc:docMk/>
+            <pc:sldMk cId="153285146" sldId="257"/>
+            <ac:cxnSpMk id="37" creationId="{BB27615E-2231-449F-B095-6E6122B73A60}"/>
+          </ac:cxnSpMkLst>
+        </pc:cxnChg>
+        <pc:cxnChg chg="add mod">
+          <ac:chgData name="Martin Meneval" userId="f13fc922f159a0eb" providerId="LiveId" clId="{E3D832BD-839D-4E50-8351-99D1232E320D}" dt="2018-03-11T18:14:43.948" v="3" actId="1076"/>
+          <ac:cxnSpMkLst>
+            <pc:docMk/>
+            <pc:sldMk cId="153285146" sldId="257"/>
+            <ac:cxnSpMk id="38" creationId="{DD0E7719-97B9-4309-B3E8-C408918FE3E2}"/>
+          </ac:cxnSpMkLst>
+        </pc:cxnChg>
+        <pc:cxnChg chg="add mod">
+          <ac:chgData name="Martin Meneval" userId="f13fc922f159a0eb" providerId="LiveId" clId="{E3D832BD-839D-4E50-8351-99D1232E320D}" dt="2018-03-11T18:14:43.948" v="3" actId="1076"/>
+          <ac:cxnSpMkLst>
+            <pc:docMk/>
+            <pc:sldMk cId="153285146" sldId="257"/>
+            <ac:cxnSpMk id="39" creationId="{657DC3C2-789C-4E71-85DC-DD3DFA7E7A58}"/>
+          </ac:cxnSpMkLst>
+        </pc:cxnChg>
+        <pc:cxnChg chg="add mod">
+          <ac:chgData name="Martin Meneval" userId="f13fc922f159a0eb" providerId="LiveId" clId="{E3D832BD-839D-4E50-8351-99D1232E320D}" dt="2018-03-11T18:14:43.948" v="3" actId="1076"/>
+          <ac:cxnSpMkLst>
+            <pc:docMk/>
+            <pc:sldMk cId="153285146" sldId="257"/>
+            <ac:cxnSpMk id="40" creationId="{6489C979-8575-4584-B1C4-42BC8B797F82}"/>
+          </ac:cxnSpMkLst>
+        </pc:cxnChg>
+      </pc:sldChg>
     </pc:docChg>
   </pc:docChgLst>
 </pc:chgInfo>
@@ -717,7 +777,7 @@
           <a:p>
             <a:fld id="{794DBB74-D09A-4609-86DC-3593467E911E}" type="datetimeFigureOut">
               <a:rPr lang="fr-FR" smtClean="0"/>
-              <a:t>04/03/2018</a:t>
+              <a:t>11/03/2018</a:t>
             </a:fld>
             <a:endParaRPr lang="fr-FR"/>
           </a:p>
@@ -887,7 +947,7 @@
           <a:p>
             <a:fld id="{794DBB74-D09A-4609-86DC-3593467E911E}" type="datetimeFigureOut">
               <a:rPr lang="fr-FR" smtClean="0"/>
-              <a:t>04/03/2018</a:t>
+              <a:t>11/03/2018</a:t>
             </a:fld>
             <a:endParaRPr lang="fr-FR"/>
           </a:p>
@@ -1067,7 +1127,7 @@
           <a:p>
             <a:fld id="{794DBB74-D09A-4609-86DC-3593467E911E}" type="datetimeFigureOut">
               <a:rPr lang="fr-FR" smtClean="0"/>
-              <a:t>04/03/2018</a:t>
+              <a:t>11/03/2018</a:t>
             </a:fld>
             <a:endParaRPr lang="fr-FR"/>
           </a:p>
@@ -1237,7 +1297,7 @@
           <a:p>
             <a:fld id="{794DBB74-D09A-4609-86DC-3593467E911E}" type="datetimeFigureOut">
               <a:rPr lang="fr-FR" smtClean="0"/>
-              <a:t>04/03/2018</a:t>
+              <a:t>11/03/2018</a:t>
             </a:fld>
             <a:endParaRPr lang="fr-FR"/>
           </a:p>
@@ -1481,7 +1541,7 @@
           <a:p>
             <a:fld id="{794DBB74-D09A-4609-86DC-3593467E911E}" type="datetimeFigureOut">
               <a:rPr lang="fr-FR" smtClean="0"/>
-              <a:t>04/03/2018</a:t>
+              <a:t>11/03/2018</a:t>
             </a:fld>
             <a:endParaRPr lang="fr-FR"/>
           </a:p>
@@ -1713,7 +1773,7 @@
           <a:p>
             <a:fld id="{794DBB74-D09A-4609-86DC-3593467E911E}" type="datetimeFigureOut">
               <a:rPr lang="fr-FR" smtClean="0"/>
-              <a:t>04/03/2018</a:t>
+              <a:t>11/03/2018</a:t>
             </a:fld>
             <a:endParaRPr lang="fr-FR"/>
           </a:p>
@@ -2080,7 +2140,7 @@
           <a:p>
             <a:fld id="{794DBB74-D09A-4609-86DC-3593467E911E}" type="datetimeFigureOut">
               <a:rPr lang="fr-FR" smtClean="0"/>
-              <a:t>04/03/2018</a:t>
+              <a:t>11/03/2018</a:t>
             </a:fld>
             <a:endParaRPr lang="fr-FR"/>
           </a:p>
@@ -2198,7 +2258,7 @@
           <a:p>
             <a:fld id="{794DBB74-D09A-4609-86DC-3593467E911E}" type="datetimeFigureOut">
               <a:rPr lang="fr-FR" smtClean="0"/>
-              <a:t>04/03/2018</a:t>
+              <a:t>11/03/2018</a:t>
             </a:fld>
             <a:endParaRPr lang="fr-FR"/>
           </a:p>
@@ -2293,7 +2353,7 @@
           <a:p>
             <a:fld id="{794DBB74-D09A-4609-86DC-3593467E911E}" type="datetimeFigureOut">
               <a:rPr lang="fr-FR" smtClean="0"/>
-              <a:t>04/03/2018</a:t>
+              <a:t>11/03/2018</a:t>
             </a:fld>
             <a:endParaRPr lang="fr-FR"/>
           </a:p>
@@ -2570,7 +2630,7 @@
           <a:p>
             <a:fld id="{794DBB74-D09A-4609-86DC-3593467E911E}" type="datetimeFigureOut">
               <a:rPr lang="fr-FR" smtClean="0"/>
-              <a:t>04/03/2018</a:t>
+              <a:t>11/03/2018</a:t>
             </a:fld>
             <a:endParaRPr lang="fr-FR"/>
           </a:p>
@@ -2827,7 +2887,7 @@
           <a:p>
             <a:fld id="{794DBB74-D09A-4609-86DC-3593467E911E}" type="datetimeFigureOut">
               <a:rPr lang="fr-FR" smtClean="0"/>
-              <a:t>04/03/2018</a:t>
+              <a:t>11/03/2018</a:t>
             </a:fld>
             <a:endParaRPr lang="fr-FR"/>
           </a:p>
@@ -3040,7 +3100,7 @@
           <a:p>
             <a:fld id="{794DBB74-D09A-4609-86DC-3593467E911E}" type="datetimeFigureOut">
               <a:rPr lang="fr-FR" smtClean="0"/>
-              <a:t>04/03/2018</a:t>
+              <a:t>11/03/2018</a:t>
             </a:fld>
             <a:endParaRPr lang="fr-FR"/>
           </a:p>
@@ -4369,6 +4429,1826 @@
 </p:sld>
 </file>
 
+<file path=ppt/slides/slide2.xml><?xml version="1.0" encoding="utf-8"?>
+<p:sld xmlns:a="http://schemas.openxmlformats.org/drawingml/2006/main" xmlns:r="http://schemas.openxmlformats.org/officeDocument/2006/relationships" xmlns:p="http://schemas.openxmlformats.org/presentationml/2006/main">
+  <p:cSld>
+    <p:spTree>
+      <p:nvGrpSpPr>
+        <p:cNvPr id="1" name=""/>
+        <p:cNvGrpSpPr/>
+        <p:nvPr/>
+      </p:nvGrpSpPr>
+      <p:grpSpPr>
+        <a:xfrm>
+          <a:off x="0" y="0"/>
+          <a:ext cx="0" cy="0"/>
+          <a:chOff x="0" y="0"/>
+          <a:chExt cx="0" cy="0"/>
+        </a:xfrm>
+      </p:grpSpPr>
+      <p:sp>
+        <p:nvSpPr>
+          <p:cNvPr id="4" name="CustomShape 1">
+            <a:extLst>
+              <a:ext uri="{FF2B5EF4-FFF2-40B4-BE49-F238E27FC236}">
+                <a16:creationId xmlns:a16="http://schemas.microsoft.com/office/drawing/2014/main" id="{11ABAF8A-93D5-4A6F-B3F9-61AB85862A12}"/>
+              </a:ext>
+            </a:extLst>
+          </p:cNvPr>
+          <p:cNvSpPr/>
+          <p:nvPr/>
+        </p:nvSpPr>
+        <p:spPr>
+          <a:xfrm>
+            <a:off x="5824796" y="3753068"/>
+            <a:ext cx="1959931" cy="2037960"/>
+          </a:xfrm>
+          <a:prstGeom prst="rect">
+            <a:avLst/>
+          </a:prstGeom>
+          <a:solidFill>
+            <a:srgbClr val="FFFFFF"/>
+          </a:solidFill>
+          <a:ln>
+            <a:solidFill>
+              <a:srgbClr val="000000"/>
+            </a:solidFill>
+          </a:ln>
+        </p:spPr>
+        <p:style>
+          <a:lnRef idx="0">
+            <a:scrgbClr r="0" g="0" b="0"/>
+          </a:lnRef>
+          <a:fillRef idx="0">
+            <a:scrgbClr r="0" g="0" b="0"/>
+          </a:fillRef>
+          <a:effectRef idx="0">
+            <a:scrgbClr r="0" g="0" b="0"/>
+          </a:effectRef>
+          <a:fontRef idx="minor"/>
+        </p:style>
+      </p:sp>
+      <p:sp>
+        <p:nvSpPr>
+          <p:cNvPr id="5" name="Line 2">
+            <a:extLst>
+              <a:ext uri="{FF2B5EF4-FFF2-40B4-BE49-F238E27FC236}">
+                <a16:creationId xmlns:a16="http://schemas.microsoft.com/office/drawing/2014/main" id="{68125A1F-1C85-4146-B93B-F898CDFC76E6}"/>
+              </a:ext>
+            </a:extLst>
+          </p:cNvPr>
+          <p:cNvSpPr/>
+          <p:nvPr/>
+        </p:nvSpPr>
+        <p:spPr>
+          <a:xfrm flipV="1">
+            <a:off x="5817158" y="4177148"/>
+            <a:ext cx="1966464" cy="3960"/>
+          </a:xfrm>
+          <a:prstGeom prst="line">
+            <a:avLst/>
+          </a:prstGeom>
+          <a:ln>
+            <a:solidFill>
+              <a:srgbClr val="000000"/>
+            </a:solidFill>
+          </a:ln>
+        </p:spPr>
+        <p:style>
+          <a:lnRef idx="0">
+            <a:scrgbClr r="0" g="0" b="0"/>
+          </a:lnRef>
+          <a:fillRef idx="0">
+            <a:scrgbClr r="0" g="0" b="0"/>
+          </a:fillRef>
+          <a:effectRef idx="0">
+            <a:scrgbClr r="0" g="0" b="0"/>
+          </a:effectRef>
+          <a:fontRef idx="minor"/>
+        </p:style>
+      </p:sp>
+      <p:sp>
+        <p:nvSpPr>
+          <p:cNvPr id="6" name="Line 3">
+            <a:extLst>
+              <a:ext uri="{FF2B5EF4-FFF2-40B4-BE49-F238E27FC236}">
+                <a16:creationId xmlns:a16="http://schemas.microsoft.com/office/drawing/2014/main" id="{58C67432-B851-4113-A405-04B96F9C0624}"/>
+              </a:ext>
+            </a:extLst>
+          </p:cNvPr>
+          <p:cNvSpPr/>
+          <p:nvPr/>
+        </p:nvSpPr>
+        <p:spPr>
+          <a:xfrm>
+            <a:off x="5824796" y="5324408"/>
+            <a:ext cx="1959931" cy="0"/>
+          </a:xfrm>
+          <a:prstGeom prst="line">
+            <a:avLst/>
+          </a:prstGeom>
+          <a:ln>
+            <a:solidFill>
+              <a:srgbClr val="000000"/>
+            </a:solidFill>
+          </a:ln>
+        </p:spPr>
+        <p:style>
+          <a:lnRef idx="0">
+            <a:scrgbClr r="0" g="0" b="0"/>
+          </a:lnRef>
+          <a:fillRef idx="0">
+            <a:scrgbClr r="0" g="0" b="0"/>
+          </a:fillRef>
+          <a:effectRef idx="0">
+            <a:scrgbClr r="0" g="0" b="0"/>
+          </a:effectRef>
+          <a:fontRef idx="minor"/>
+        </p:style>
+      </p:sp>
+      <p:sp>
+        <p:nvSpPr>
+          <p:cNvPr id="7" name="CustomShape 4">
+            <a:extLst>
+              <a:ext uri="{FF2B5EF4-FFF2-40B4-BE49-F238E27FC236}">
+                <a16:creationId xmlns:a16="http://schemas.microsoft.com/office/drawing/2014/main" id="{42CA8282-F98B-4529-A445-642BA1BD4C8F}"/>
+              </a:ext>
+            </a:extLst>
+          </p:cNvPr>
+          <p:cNvSpPr/>
+          <p:nvPr/>
+        </p:nvSpPr>
+        <p:spPr>
+          <a:xfrm>
+            <a:off x="3528528" y="3742921"/>
+            <a:ext cx="1992357" cy="2042636"/>
+          </a:xfrm>
+          <a:prstGeom prst="rect">
+            <a:avLst/>
+          </a:prstGeom>
+          <a:solidFill>
+            <a:srgbClr val="FFFFFF"/>
+          </a:solidFill>
+          <a:ln>
+            <a:solidFill>
+              <a:srgbClr val="000000"/>
+            </a:solidFill>
+          </a:ln>
+        </p:spPr>
+        <p:style>
+          <a:lnRef idx="0">
+            <a:scrgbClr r="0" g="0" b="0"/>
+          </a:lnRef>
+          <a:fillRef idx="0">
+            <a:scrgbClr r="0" g="0" b="0"/>
+          </a:fillRef>
+          <a:effectRef idx="0">
+            <a:scrgbClr r="0" g="0" b="0"/>
+          </a:effectRef>
+          <a:fontRef idx="minor"/>
+        </p:style>
+      </p:sp>
+      <p:sp>
+        <p:nvSpPr>
+          <p:cNvPr id="8" name="Line 5">
+            <a:extLst>
+              <a:ext uri="{FF2B5EF4-FFF2-40B4-BE49-F238E27FC236}">
+                <a16:creationId xmlns:a16="http://schemas.microsoft.com/office/drawing/2014/main" id="{8E128D06-87DE-4282-86F7-A978728C2C70}"/>
+              </a:ext>
+            </a:extLst>
+          </p:cNvPr>
+          <p:cNvSpPr/>
+          <p:nvPr/>
+        </p:nvSpPr>
+        <p:spPr>
+          <a:xfrm>
+            <a:off x="3527624" y="4178880"/>
+            <a:ext cx="2000899" cy="8607"/>
+          </a:xfrm>
+          <a:prstGeom prst="line">
+            <a:avLst/>
+          </a:prstGeom>
+          <a:ln>
+            <a:solidFill>
+              <a:srgbClr val="000000"/>
+            </a:solidFill>
+          </a:ln>
+        </p:spPr>
+        <p:style>
+          <a:lnRef idx="0">
+            <a:scrgbClr r="0" g="0" b="0"/>
+          </a:lnRef>
+          <a:fillRef idx="0">
+            <a:scrgbClr r="0" g="0" b="0"/>
+          </a:fillRef>
+          <a:effectRef idx="0">
+            <a:scrgbClr r="0" g="0" b="0"/>
+          </a:effectRef>
+          <a:fontRef idx="minor"/>
+        </p:style>
+      </p:sp>
+      <p:sp>
+        <p:nvSpPr>
+          <p:cNvPr id="9" name="Line 6">
+            <a:extLst>
+              <a:ext uri="{FF2B5EF4-FFF2-40B4-BE49-F238E27FC236}">
+                <a16:creationId xmlns:a16="http://schemas.microsoft.com/office/drawing/2014/main" id="{3FD9AAE9-1A6C-4624-9A77-29BD929DCE1F}"/>
+              </a:ext>
+            </a:extLst>
+          </p:cNvPr>
+          <p:cNvSpPr/>
+          <p:nvPr/>
+        </p:nvSpPr>
+        <p:spPr>
+          <a:xfrm>
+            <a:off x="3527624" y="4786920"/>
+            <a:ext cx="1992357" cy="11581"/>
+          </a:xfrm>
+          <a:prstGeom prst="line">
+            <a:avLst/>
+          </a:prstGeom>
+          <a:ln>
+            <a:solidFill>
+              <a:srgbClr val="000000"/>
+            </a:solidFill>
+          </a:ln>
+        </p:spPr>
+        <p:style>
+          <a:lnRef idx="0">
+            <a:scrgbClr r="0" g="0" b="0"/>
+          </a:lnRef>
+          <a:fillRef idx="0">
+            <a:scrgbClr r="0" g="0" b="0"/>
+          </a:fillRef>
+          <a:effectRef idx="0">
+            <a:scrgbClr r="0" g="0" b="0"/>
+          </a:effectRef>
+          <a:fontRef idx="minor"/>
+        </p:style>
+      </p:sp>
+      <p:sp>
+        <p:nvSpPr>
+          <p:cNvPr id="10" name="CustomShape 7">
+            <a:extLst>
+              <a:ext uri="{FF2B5EF4-FFF2-40B4-BE49-F238E27FC236}">
+                <a16:creationId xmlns:a16="http://schemas.microsoft.com/office/drawing/2014/main" id="{F646CDD0-5789-461A-A1E2-C629D58FE517}"/>
+              </a:ext>
+            </a:extLst>
+          </p:cNvPr>
+          <p:cNvSpPr/>
+          <p:nvPr/>
+        </p:nvSpPr>
+        <p:spPr>
+          <a:xfrm>
+            <a:off x="1340388" y="3742921"/>
+            <a:ext cx="1910520" cy="2051673"/>
+          </a:xfrm>
+          <a:prstGeom prst="rect">
+            <a:avLst/>
+          </a:prstGeom>
+          <a:solidFill>
+            <a:srgbClr val="FFFFFF"/>
+          </a:solidFill>
+          <a:ln>
+            <a:solidFill>
+              <a:srgbClr val="000000"/>
+            </a:solidFill>
+          </a:ln>
+        </p:spPr>
+        <p:style>
+          <a:lnRef idx="0">
+            <a:scrgbClr r="0" g="0" b="0"/>
+          </a:lnRef>
+          <a:fillRef idx="0">
+            <a:scrgbClr r="0" g="0" b="0"/>
+          </a:fillRef>
+          <a:effectRef idx="0">
+            <a:scrgbClr r="0" g="0" b="0"/>
+          </a:effectRef>
+          <a:fontRef idx="minor"/>
+        </p:style>
+        <p:txBody>
+          <a:bodyPr/>
+          <a:lstStyle/>
+          <a:p>
+            <a:endParaRPr lang="fr-FR" dirty="0"/>
+          </a:p>
+        </p:txBody>
+      </p:sp>
+      <p:sp>
+        <p:nvSpPr>
+          <p:cNvPr id="11" name="Line 8">
+            <a:extLst>
+              <a:ext uri="{FF2B5EF4-FFF2-40B4-BE49-F238E27FC236}">
+                <a16:creationId xmlns:a16="http://schemas.microsoft.com/office/drawing/2014/main" id="{9CA5A51D-96E9-422B-824B-C20379AE0451}"/>
+              </a:ext>
+            </a:extLst>
+          </p:cNvPr>
+          <p:cNvSpPr/>
+          <p:nvPr/>
+        </p:nvSpPr>
+        <p:spPr>
+          <a:xfrm>
+            <a:off x="1338228" y="4214882"/>
+            <a:ext cx="1909800" cy="0"/>
+          </a:xfrm>
+          <a:prstGeom prst="line">
+            <a:avLst/>
+          </a:prstGeom>
+          <a:ln>
+            <a:solidFill>
+              <a:srgbClr val="000000"/>
+            </a:solidFill>
+          </a:ln>
+        </p:spPr>
+        <p:style>
+          <a:lnRef idx="0">
+            <a:scrgbClr r="0" g="0" b="0"/>
+          </a:lnRef>
+          <a:fillRef idx="0">
+            <a:scrgbClr r="0" g="0" b="0"/>
+          </a:fillRef>
+          <a:effectRef idx="0">
+            <a:scrgbClr r="0" g="0" b="0"/>
+          </a:effectRef>
+          <a:fontRef idx="minor"/>
+        </p:style>
+      </p:sp>
+      <p:sp>
+        <p:nvSpPr>
+          <p:cNvPr id="12" name="Line 9">
+            <a:extLst>
+              <a:ext uri="{FF2B5EF4-FFF2-40B4-BE49-F238E27FC236}">
+                <a16:creationId xmlns:a16="http://schemas.microsoft.com/office/drawing/2014/main" id="{C5921BA8-AA03-402B-83C5-452B1B88DE0F}"/>
+              </a:ext>
+            </a:extLst>
+          </p:cNvPr>
+          <p:cNvSpPr/>
+          <p:nvPr/>
+        </p:nvSpPr>
+        <p:spPr>
+          <a:xfrm>
+            <a:off x="1341108" y="4570922"/>
+            <a:ext cx="1909800" cy="0"/>
+          </a:xfrm>
+          <a:prstGeom prst="line">
+            <a:avLst/>
+          </a:prstGeom>
+          <a:ln>
+            <a:solidFill>
+              <a:srgbClr val="000000"/>
+            </a:solidFill>
+          </a:ln>
+        </p:spPr>
+        <p:style>
+          <a:lnRef idx="0">
+            <a:scrgbClr r="0" g="0" b="0"/>
+          </a:lnRef>
+          <a:fillRef idx="0">
+            <a:scrgbClr r="0" g="0" b="0"/>
+          </a:fillRef>
+          <a:effectRef idx="0">
+            <a:scrgbClr r="0" g="0" b="0"/>
+          </a:effectRef>
+          <a:fontRef idx="minor"/>
+        </p:style>
+        <p:txBody>
+          <a:bodyPr/>
+          <a:lstStyle/>
+          <a:p>
+            <a:endParaRPr lang="fr-FR" dirty="0"/>
+          </a:p>
+        </p:txBody>
+      </p:sp>
+      <p:sp>
+        <p:nvSpPr>
+          <p:cNvPr id="13" name="TextShape 10">
+            <a:extLst>
+              <a:ext uri="{FF2B5EF4-FFF2-40B4-BE49-F238E27FC236}">
+                <a16:creationId xmlns:a16="http://schemas.microsoft.com/office/drawing/2014/main" id="{C41EA2EE-790B-43C1-ABDB-5CAA46E22D92}"/>
+              </a:ext>
+            </a:extLst>
+          </p:cNvPr>
+          <p:cNvSpPr txBox="1"/>
+          <p:nvPr/>
+        </p:nvSpPr>
+        <p:spPr>
+          <a:xfrm>
+            <a:off x="5832434" y="3810848"/>
+            <a:ext cx="1951188" cy="414000"/>
+          </a:xfrm>
+          <a:prstGeom prst="rect">
+            <a:avLst/>
+          </a:prstGeom>
+          <a:noFill/>
+          <a:ln>
+            <a:noFill/>
+          </a:ln>
+        </p:spPr>
+        <p:txBody>
+          <a:bodyPr lIns="90000" tIns="45000" rIns="90000" bIns="45000"/>
+          <a:lstStyle/>
+          <a:p>
+            <a:pPr algn="ctr">
+              <a:lnSpc>
+                <a:spcPct val="100000"/>
+              </a:lnSpc>
+            </a:pPr>
+            <a:r>
+              <a:rPr lang="fr-FR" sz="1400" b="0" strike="noStrike" spc="-1" dirty="0">
+                <a:latin typeface="Arial"/>
+                <a:ea typeface="Microsoft YaHei"/>
+              </a:rPr>
+              <a:t>ELEVE</a:t>
+            </a:r>
+            <a:endParaRPr lang="fr-FR" sz="1400" b="0" strike="noStrike" spc="-1" dirty="0">
+              <a:latin typeface="Arial"/>
+            </a:endParaRPr>
+          </a:p>
+        </p:txBody>
+      </p:sp>
+      <p:sp>
+        <p:nvSpPr>
+          <p:cNvPr id="14" name="TextShape 11">
+            <a:extLst>
+              <a:ext uri="{FF2B5EF4-FFF2-40B4-BE49-F238E27FC236}">
+                <a16:creationId xmlns:a16="http://schemas.microsoft.com/office/drawing/2014/main" id="{C47FFEE6-1CC6-4BF2-8F43-4EBA34752712}"/>
+              </a:ext>
+            </a:extLst>
+          </p:cNvPr>
+          <p:cNvSpPr txBox="1"/>
+          <p:nvPr/>
+        </p:nvSpPr>
+        <p:spPr>
+          <a:xfrm>
+            <a:off x="3832439" y="3818521"/>
+            <a:ext cx="1460880" cy="378360"/>
+          </a:xfrm>
+          <a:prstGeom prst="rect">
+            <a:avLst/>
+          </a:prstGeom>
+          <a:noFill/>
+          <a:ln>
+            <a:noFill/>
+          </a:ln>
+        </p:spPr>
+        <p:txBody>
+          <a:bodyPr lIns="90000" tIns="45000" rIns="90000" bIns="45000"/>
+          <a:lstStyle/>
+          <a:p>
+            <a:pPr>
+              <a:lnSpc>
+                <a:spcPct val="100000"/>
+              </a:lnSpc>
+            </a:pPr>
+            <a:r>
+              <a:rPr lang="fr-FR" sz="1400" b="0" strike="noStrike" spc="-1" dirty="0">
+                <a:latin typeface="Arial"/>
+                <a:ea typeface="Microsoft YaHei"/>
+              </a:rPr>
+              <a:t>PROFESSEUR</a:t>
+            </a:r>
+            <a:endParaRPr lang="fr-FR" sz="1400" b="0" strike="noStrike" spc="-1" dirty="0">
+              <a:latin typeface="Arial"/>
+            </a:endParaRPr>
+          </a:p>
+        </p:txBody>
+      </p:sp>
+      <p:sp>
+        <p:nvSpPr>
+          <p:cNvPr id="15" name="TextShape 12">
+            <a:extLst>
+              <a:ext uri="{FF2B5EF4-FFF2-40B4-BE49-F238E27FC236}">
+                <a16:creationId xmlns:a16="http://schemas.microsoft.com/office/drawing/2014/main" id="{71673987-BCDE-4AA7-BEE7-78AC11320DCF}"/>
+              </a:ext>
+            </a:extLst>
+          </p:cNvPr>
+          <p:cNvSpPr txBox="1"/>
+          <p:nvPr/>
+        </p:nvSpPr>
+        <p:spPr>
+          <a:xfrm>
+            <a:off x="1450908" y="3836882"/>
+            <a:ext cx="1825920" cy="414000"/>
+          </a:xfrm>
+          <a:prstGeom prst="rect">
+            <a:avLst/>
+          </a:prstGeom>
+          <a:noFill/>
+          <a:ln>
+            <a:noFill/>
+          </a:ln>
+        </p:spPr>
+        <p:txBody>
+          <a:bodyPr lIns="90000" tIns="45000" rIns="90000" bIns="45000"/>
+          <a:lstStyle/>
+          <a:p>
+            <a:pPr>
+              <a:lnSpc>
+                <a:spcPct val="100000"/>
+              </a:lnSpc>
+            </a:pPr>
+            <a:r>
+              <a:rPr lang="fr-FR" sz="1400" b="0" strike="noStrike" spc="-1" dirty="0">
+                <a:latin typeface="Arial"/>
+                <a:ea typeface="Microsoft YaHei"/>
+              </a:rPr>
+              <a:t>ADMINISTRATEUR</a:t>
+            </a:r>
+            <a:endParaRPr lang="fr-FR" sz="1400" b="0" strike="noStrike" spc="-1" dirty="0">
+              <a:latin typeface="Arial"/>
+            </a:endParaRPr>
+          </a:p>
+        </p:txBody>
+      </p:sp>
+      <p:sp>
+        <p:nvSpPr>
+          <p:cNvPr id="16" name="TextShape 13">
+            <a:extLst>
+              <a:ext uri="{FF2B5EF4-FFF2-40B4-BE49-F238E27FC236}">
+                <a16:creationId xmlns:a16="http://schemas.microsoft.com/office/drawing/2014/main" id="{11B10CDD-4D1F-4D77-81E4-1A7C266F7C0E}"/>
+              </a:ext>
+            </a:extLst>
+          </p:cNvPr>
+          <p:cNvSpPr txBox="1"/>
+          <p:nvPr/>
+        </p:nvSpPr>
+        <p:spPr>
+          <a:xfrm>
+            <a:off x="3536674" y="4233781"/>
+            <a:ext cx="2088320" cy="431640"/>
+          </a:xfrm>
+          <a:prstGeom prst="rect">
+            <a:avLst/>
+          </a:prstGeom>
+          <a:noFill/>
+          <a:ln>
+            <a:noFill/>
+          </a:ln>
+        </p:spPr>
+        <p:txBody>
+          <a:bodyPr lIns="90000" tIns="45000" rIns="90000" bIns="45000"/>
+          <a:lstStyle/>
+          <a:p>
+            <a:pPr>
+              <a:lnSpc>
+                <a:spcPct val="100000"/>
+              </a:lnSpc>
+            </a:pPr>
+            <a:r>
+              <a:rPr lang="fr-FR" sz="1200" b="0" strike="noStrike" spc="-1" dirty="0">
+                <a:latin typeface="Arial"/>
+                <a:ea typeface="Microsoft YaHei"/>
+              </a:rPr>
+              <a:t>- Num_professeur : Int</a:t>
+            </a:r>
+          </a:p>
+          <a:p>
+            <a:pPr>
+              <a:lnSpc>
+                <a:spcPct val="100000"/>
+              </a:lnSpc>
+            </a:pPr>
+            <a:r>
+              <a:rPr lang="fr-FR" sz="1200" spc="-1" dirty="0">
+                <a:latin typeface="Arial"/>
+                <a:ea typeface="Microsoft YaHei"/>
+              </a:rPr>
+              <a:t>- Date_de_naissance : Int</a:t>
+            </a:r>
+            <a:endParaRPr lang="fr-FR" sz="1200" b="0" strike="noStrike" spc="-1" dirty="0">
+              <a:latin typeface="Arial"/>
+              <a:ea typeface="Microsoft YaHei"/>
+            </a:endParaRPr>
+          </a:p>
+        </p:txBody>
+      </p:sp>
+      <p:sp>
+        <p:nvSpPr>
+          <p:cNvPr id="17" name="TextShape 14">
+            <a:extLst>
+              <a:ext uri="{FF2B5EF4-FFF2-40B4-BE49-F238E27FC236}">
+                <a16:creationId xmlns:a16="http://schemas.microsoft.com/office/drawing/2014/main" id="{DBE96A30-7256-4B08-A664-4E977D991D73}"/>
+              </a:ext>
+            </a:extLst>
+          </p:cNvPr>
+          <p:cNvSpPr txBox="1"/>
+          <p:nvPr/>
+        </p:nvSpPr>
+        <p:spPr>
+          <a:xfrm>
+            <a:off x="5796459" y="4285341"/>
+            <a:ext cx="2300993" cy="799242"/>
+          </a:xfrm>
+          <a:prstGeom prst="rect">
+            <a:avLst/>
+          </a:prstGeom>
+          <a:noFill/>
+          <a:ln>
+            <a:noFill/>
+          </a:ln>
+        </p:spPr>
+        <p:txBody>
+          <a:bodyPr lIns="90000" tIns="45000" rIns="90000" bIns="45000"/>
+          <a:lstStyle/>
+          <a:p>
+            <a:pPr>
+              <a:lnSpc>
+                <a:spcPct val="100000"/>
+              </a:lnSpc>
+            </a:pPr>
+            <a:r>
+              <a:rPr lang="fr-FR" sz="1200" b="0" strike="noStrike" spc="-1" dirty="0">
+                <a:latin typeface="Arial"/>
+                <a:ea typeface="Microsoft YaHei"/>
+              </a:rPr>
+              <a:t>- Num_eleve : Int</a:t>
+            </a:r>
+            <a:endParaRPr lang="fr-FR" sz="1200" b="0" strike="noStrike" spc="-1" dirty="0">
+              <a:latin typeface="Arial"/>
+            </a:endParaRPr>
+          </a:p>
+          <a:p>
+            <a:pPr>
+              <a:lnSpc>
+                <a:spcPct val="100000"/>
+              </a:lnSpc>
+            </a:pPr>
+            <a:r>
+              <a:rPr lang="fr-FR" sz="1200" b="0" strike="noStrike" spc="-1" dirty="0">
+                <a:latin typeface="Arial"/>
+                <a:ea typeface="Microsoft YaHei"/>
+              </a:rPr>
+              <a:t>- Annee_etude_eleve : Int</a:t>
+            </a:r>
+          </a:p>
+          <a:p>
+            <a:pPr>
+              <a:lnSpc>
+                <a:spcPct val="100000"/>
+              </a:lnSpc>
+            </a:pPr>
+            <a:r>
+              <a:rPr lang="fr-FR" sz="1200" spc="-1" dirty="0">
+                <a:latin typeface="Arial"/>
+                <a:ea typeface="Microsoft YaHei"/>
+              </a:rPr>
+              <a:t>- Date_de_naissance : Date</a:t>
+            </a:r>
+          </a:p>
+          <a:p>
+            <a:pPr>
+              <a:lnSpc>
+                <a:spcPct val="100000"/>
+              </a:lnSpc>
+            </a:pPr>
+            <a:r>
+              <a:rPr lang="fr-FR" sz="1200" b="0" strike="noStrike" spc="-1" dirty="0">
+                <a:latin typeface="Arial"/>
+                <a:ea typeface="Microsoft YaHei"/>
+              </a:rPr>
+              <a:t>- Num_INE : String</a:t>
+            </a:r>
+            <a:endParaRPr lang="fr-FR" sz="1200" b="0" strike="noStrike" spc="-1" dirty="0">
+              <a:latin typeface="Arial"/>
+            </a:endParaRPr>
+          </a:p>
+        </p:txBody>
+      </p:sp>
+      <p:sp>
+        <p:nvSpPr>
+          <p:cNvPr id="18" name="TextShape 15">
+            <a:extLst>
+              <a:ext uri="{FF2B5EF4-FFF2-40B4-BE49-F238E27FC236}">
+                <a16:creationId xmlns:a16="http://schemas.microsoft.com/office/drawing/2014/main" id="{F874710D-6F78-4BAD-9B26-D746E270C82C}"/>
+              </a:ext>
+            </a:extLst>
+          </p:cNvPr>
+          <p:cNvSpPr txBox="1"/>
+          <p:nvPr/>
+        </p:nvSpPr>
+        <p:spPr>
+          <a:xfrm>
+            <a:off x="1375390" y="4214343"/>
+            <a:ext cx="1900975" cy="261000"/>
+          </a:xfrm>
+          <a:prstGeom prst="rect">
+            <a:avLst/>
+          </a:prstGeom>
+          <a:noFill/>
+          <a:ln>
+            <a:noFill/>
+          </a:ln>
+        </p:spPr>
+        <p:txBody>
+          <a:bodyPr lIns="90000" tIns="45000" rIns="90000" bIns="45000"/>
+          <a:lstStyle/>
+          <a:p>
+            <a:pPr>
+              <a:lnSpc>
+                <a:spcPct val="100000"/>
+              </a:lnSpc>
+            </a:pPr>
+            <a:r>
+              <a:rPr lang="fr-FR" sz="1200" b="0" strike="noStrike" spc="-1" dirty="0">
+                <a:latin typeface="Arial"/>
+                <a:ea typeface="Microsoft YaHei"/>
+              </a:rPr>
+              <a:t>- Num_admin : Int</a:t>
+            </a:r>
+            <a:endParaRPr lang="fr-FR" sz="1200" b="0" strike="noStrike" spc="-1" dirty="0">
+              <a:latin typeface="Arial"/>
+            </a:endParaRPr>
+          </a:p>
+        </p:txBody>
+      </p:sp>
+      <p:sp>
+        <p:nvSpPr>
+          <p:cNvPr id="19" name="CustomShape 16">
+            <a:extLst>
+              <a:ext uri="{FF2B5EF4-FFF2-40B4-BE49-F238E27FC236}">
+                <a16:creationId xmlns:a16="http://schemas.microsoft.com/office/drawing/2014/main" id="{41853B23-2D74-4544-9224-CE7881CA2AB2}"/>
+              </a:ext>
+            </a:extLst>
+          </p:cNvPr>
+          <p:cNvSpPr/>
+          <p:nvPr/>
+        </p:nvSpPr>
+        <p:spPr>
+          <a:xfrm>
+            <a:off x="1915803" y="637256"/>
+            <a:ext cx="2089921" cy="1332000"/>
+          </a:xfrm>
+          <a:prstGeom prst="rect">
+            <a:avLst/>
+          </a:prstGeom>
+          <a:solidFill>
+            <a:srgbClr val="FFFFFF"/>
+          </a:solidFill>
+          <a:ln>
+            <a:solidFill>
+              <a:srgbClr val="000000"/>
+            </a:solidFill>
+          </a:ln>
+        </p:spPr>
+        <p:style>
+          <a:lnRef idx="0">
+            <a:scrgbClr r="0" g="0" b="0"/>
+          </a:lnRef>
+          <a:fillRef idx="0">
+            <a:scrgbClr r="0" g="0" b="0"/>
+          </a:fillRef>
+          <a:effectRef idx="0">
+            <a:scrgbClr r="0" g="0" b="0"/>
+          </a:effectRef>
+          <a:fontRef idx="minor"/>
+        </p:style>
+      </p:sp>
+      <p:sp>
+        <p:nvSpPr>
+          <p:cNvPr id="20" name="Line 17">
+            <a:extLst>
+              <a:ext uri="{FF2B5EF4-FFF2-40B4-BE49-F238E27FC236}">
+                <a16:creationId xmlns:a16="http://schemas.microsoft.com/office/drawing/2014/main" id="{45B386CF-43F6-40C3-B19C-B9F8CD7A6527}"/>
+              </a:ext>
+            </a:extLst>
+          </p:cNvPr>
+          <p:cNvSpPr/>
+          <p:nvPr/>
+        </p:nvSpPr>
+        <p:spPr>
+          <a:xfrm>
+            <a:off x="1915803" y="917424"/>
+            <a:ext cx="2089922" cy="0"/>
+          </a:xfrm>
+          <a:prstGeom prst="line">
+            <a:avLst/>
+          </a:prstGeom>
+          <a:ln>
+            <a:solidFill>
+              <a:srgbClr val="000000"/>
+            </a:solidFill>
+          </a:ln>
+        </p:spPr>
+        <p:style>
+          <a:lnRef idx="0">
+            <a:scrgbClr r="0" g="0" b="0"/>
+          </a:lnRef>
+          <a:fillRef idx="0">
+            <a:scrgbClr r="0" g="0" b="0"/>
+          </a:fillRef>
+          <a:effectRef idx="0">
+            <a:scrgbClr r="0" g="0" b="0"/>
+          </a:effectRef>
+          <a:fontRef idx="minor"/>
+        </p:style>
+      </p:sp>
+      <p:sp>
+        <p:nvSpPr>
+          <p:cNvPr id="21" name="Line 18">
+            <a:extLst>
+              <a:ext uri="{FF2B5EF4-FFF2-40B4-BE49-F238E27FC236}">
+                <a16:creationId xmlns:a16="http://schemas.microsoft.com/office/drawing/2014/main" id="{EA630C2C-B8CF-482C-9293-3938DFED7186}"/>
+              </a:ext>
+            </a:extLst>
+          </p:cNvPr>
+          <p:cNvSpPr/>
+          <p:nvPr/>
+        </p:nvSpPr>
+        <p:spPr>
+          <a:xfrm flipV="1">
+            <a:off x="1915803" y="1761075"/>
+            <a:ext cx="2089921" cy="12634"/>
+          </a:xfrm>
+          <a:prstGeom prst="line">
+            <a:avLst/>
+          </a:prstGeom>
+          <a:ln>
+            <a:solidFill>
+              <a:srgbClr val="000000"/>
+            </a:solidFill>
+          </a:ln>
+        </p:spPr>
+        <p:style>
+          <a:lnRef idx="0">
+            <a:scrgbClr r="0" g="0" b="0"/>
+          </a:lnRef>
+          <a:fillRef idx="0">
+            <a:scrgbClr r="0" g="0" b="0"/>
+          </a:fillRef>
+          <a:effectRef idx="0">
+            <a:scrgbClr r="0" g="0" b="0"/>
+          </a:effectRef>
+          <a:fontRef idx="minor"/>
+        </p:style>
+      </p:sp>
+      <p:sp>
+        <p:nvSpPr>
+          <p:cNvPr id="22" name="TextShape 19">
+            <a:extLst>
+              <a:ext uri="{FF2B5EF4-FFF2-40B4-BE49-F238E27FC236}">
+                <a16:creationId xmlns:a16="http://schemas.microsoft.com/office/drawing/2014/main" id="{05BF7FCF-F302-4CF2-B729-53C33DBECCC3}"/>
+              </a:ext>
+            </a:extLst>
+          </p:cNvPr>
+          <p:cNvSpPr txBox="1"/>
+          <p:nvPr/>
+        </p:nvSpPr>
+        <p:spPr>
+          <a:xfrm>
+            <a:off x="1920485" y="662962"/>
+            <a:ext cx="1405440" cy="290160"/>
+          </a:xfrm>
+          <a:prstGeom prst="rect">
+            <a:avLst/>
+          </a:prstGeom>
+          <a:noFill/>
+          <a:ln>
+            <a:noFill/>
+          </a:ln>
+        </p:spPr>
+        <p:txBody>
+          <a:bodyPr lIns="90000" tIns="45000" rIns="90000" bIns="45000"/>
+          <a:lstStyle/>
+          <a:p>
+            <a:pPr>
+              <a:lnSpc>
+                <a:spcPct val="100000"/>
+              </a:lnSpc>
+            </a:pPr>
+            <a:r>
+              <a:rPr lang="fr-FR" sz="1400" b="0" strike="noStrike" spc="-1" dirty="0">
+                <a:latin typeface="Arial"/>
+                <a:ea typeface="Microsoft YaHei"/>
+              </a:rPr>
+              <a:t>UTILISATEUR</a:t>
+            </a:r>
+            <a:endParaRPr lang="fr-FR" sz="1400" b="0" strike="noStrike" spc="-1" dirty="0">
+              <a:latin typeface="Arial"/>
+            </a:endParaRPr>
+          </a:p>
+        </p:txBody>
+      </p:sp>
+      <p:sp>
+        <p:nvSpPr>
+          <p:cNvPr id="23" name="TextShape 20">
+            <a:extLst>
+              <a:ext uri="{FF2B5EF4-FFF2-40B4-BE49-F238E27FC236}">
+                <a16:creationId xmlns:a16="http://schemas.microsoft.com/office/drawing/2014/main" id="{1F6BF0D6-D3E1-4426-B065-0D405E263B79}"/>
+              </a:ext>
+            </a:extLst>
+          </p:cNvPr>
+          <p:cNvSpPr txBox="1"/>
+          <p:nvPr/>
+        </p:nvSpPr>
+        <p:spPr>
+          <a:xfrm>
+            <a:off x="1920484" y="954144"/>
+            <a:ext cx="2080558" cy="431640"/>
+          </a:xfrm>
+          <a:prstGeom prst="rect">
+            <a:avLst/>
+          </a:prstGeom>
+          <a:noFill/>
+          <a:ln>
+            <a:noFill/>
+          </a:ln>
+        </p:spPr>
+        <p:txBody>
+          <a:bodyPr lIns="90000" tIns="45000" rIns="90000" bIns="45000"/>
+          <a:lstStyle/>
+          <a:p>
+            <a:pPr>
+              <a:lnSpc>
+                <a:spcPct val="100000"/>
+              </a:lnSpc>
+            </a:pPr>
+            <a:r>
+              <a:rPr lang="fr-FR" sz="1200" b="0" strike="noStrike" spc="-1" dirty="0">
+                <a:latin typeface="Arial"/>
+                <a:ea typeface="Microsoft YaHei"/>
+              </a:rPr>
+              <a:t>- Nom : String</a:t>
+            </a:r>
+            <a:endParaRPr lang="fr-FR" sz="1200" b="0" strike="noStrike" spc="-1" dirty="0">
+              <a:latin typeface="Arial"/>
+            </a:endParaRPr>
+          </a:p>
+          <a:p>
+            <a:pPr>
+              <a:lnSpc>
+                <a:spcPct val="100000"/>
+              </a:lnSpc>
+            </a:pPr>
+            <a:r>
+              <a:rPr lang="fr-FR" sz="1200" b="0" strike="noStrike" spc="-1" dirty="0">
+                <a:latin typeface="Arial"/>
+                <a:ea typeface="Microsoft YaHei"/>
+              </a:rPr>
+              <a:t>- Prenom : String</a:t>
+            </a:r>
+          </a:p>
+          <a:p>
+            <a:pPr>
+              <a:lnSpc>
+                <a:spcPct val="100000"/>
+              </a:lnSpc>
+            </a:pPr>
+            <a:r>
+              <a:rPr lang="fr-FR" sz="1200" spc="-1" dirty="0">
+                <a:latin typeface="Arial"/>
+                <a:ea typeface="Microsoft YaHei"/>
+              </a:rPr>
+              <a:t>- Email : String</a:t>
+            </a:r>
+          </a:p>
+          <a:p>
+            <a:pPr>
+              <a:lnSpc>
+                <a:spcPct val="100000"/>
+              </a:lnSpc>
+            </a:pPr>
+            <a:r>
+              <a:rPr lang="fr-FR" sz="1200" b="0" strike="noStrike" spc="-1" dirty="0">
+                <a:latin typeface="Arial"/>
+                <a:ea typeface="Microsoft YaHei"/>
+              </a:rPr>
+              <a:t>- Mot_de_passe : String</a:t>
+            </a:r>
+            <a:endParaRPr lang="fr-FR" sz="1200" b="0" strike="noStrike" spc="-1" dirty="0">
+              <a:latin typeface="Arial"/>
+            </a:endParaRPr>
+          </a:p>
+        </p:txBody>
+      </p:sp>
+      <p:sp>
+        <p:nvSpPr>
+          <p:cNvPr id="24" name="CustomShape 25">
+            <a:extLst>
+              <a:ext uri="{FF2B5EF4-FFF2-40B4-BE49-F238E27FC236}">
+                <a16:creationId xmlns:a16="http://schemas.microsoft.com/office/drawing/2014/main" id="{56094E21-61CE-44C4-8408-900F2D00E832}"/>
+              </a:ext>
+            </a:extLst>
+          </p:cNvPr>
+          <p:cNvSpPr/>
+          <p:nvPr/>
+        </p:nvSpPr>
+        <p:spPr>
+          <a:xfrm>
+            <a:off x="6105773" y="710359"/>
+            <a:ext cx="1393200" cy="1364000"/>
+          </a:xfrm>
+          <a:prstGeom prst="rect">
+            <a:avLst/>
+          </a:prstGeom>
+          <a:solidFill>
+            <a:srgbClr val="FFFFFF"/>
+          </a:solidFill>
+          <a:ln>
+            <a:solidFill>
+              <a:srgbClr val="000000"/>
+            </a:solidFill>
+          </a:ln>
+        </p:spPr>
+        <p:style>
+          <a:lnRef idx="0">
+            <a:scrgbClr r="0" g="0" b="0"/>
+          </a:lnRef>
+          <a:fillRef idx="0">
+            <a:scrgbClr r="0" g="0" b="0"/>
+          </a:fillRef>
+          <a:effectRef idx="0">
+            <a:scrgbClr r="0" g="0" b="0"/>
+          </a:effectRef>
+          <a:fontRef idx="minor"/>
+        </p:style>
+      </p:sp>
+      <p:sp>
+        <p:nvSpPr>
+          <p:cNvPr id="25" name="Line 26">
+            <a:extLst>
+              <a:ext uri="{FF2B5EF4-FFF2-40B4-BE49-F238E27FC236}">
+                <a16:creationId xmlns:a16="http://schemas.microsoft.com/office/drawing/2014/main" id="{8F6A275A-FEB8-4CE1-B0AA-CE6E26EF9934}"/>
+              </a:ext>
+            </a:extLst>
+          </p:cNvPr>
+          <p:cNvSpPr/>
+          <p:nvPr/>
+        </p:nvSpPr>
+        <p:spPr>
+          <a:xfrm flipV="1">
+            <a:off x="6105413" y="1142359"/>
+            <a:ext cx="1393560" cy="3960"/>
+          </a:xfrm>
+          <a:prstGeom prst="line">
+            <a:avLst/>
+          </a:prstGeom>
+          <a:ln>
+            <a:solidFill>
+              <a:srgbClr val="000000"/>
+            </a:solidFill>
+          </a:ln>
+        </p:spPr>
+        <p:style>
+          <a:lnRef idx="0">
+            <a:scrgbClr r="0" g="0" b="0"/>
+          </a:lnRef>
+          <a:fillRef idx="0">
+            <a:scrgbClr r="0" g="0" b="0"/>
+          </a:fillRef>
+          <a:effectRef idx="0">
+            <a:scrgbClr r="0" g="0" b="0"/>
+          </a:effectRef>
+          <a:fontRef idx="minor"/>
+        </p:style>
+      </p:sp>
+      <p:sp>
+        <p:nvSpPr>
+          <p:cNvPr id="26" name="Line 27">
+            <a:extLst>
+              <a:ext uri="{FF2B5EF4-FFF2-40B4-BE49-F238E27FC236}">
+                <a16:creationId xmlns:a16="http://schemas.microsoft.com/office/drawing/2014/main" id="{FF9BD744-4BCB-4A1C-93DA-A1749C0641DC}"/>
+              </a:ext>
+            </a:extLst>
+          </p:cNvPr>
+          <p:cNvSpPr/>
+          <p:nvPr/>
+        </p:nvSpPr>
+        <p:spPr>
+          <a:xfrm>
+            <a:off x="6101093" y="1826359"/>
+            <a:ext cx="1393560" cy="0"/>
+          </a:xfrm>
+          <a:prstGeom prst="line">
+            <a:avLst/>
+          </a:prstGeom>
+          <a:ln>
+            <a:solidFill>
+              <a:srgbClr val="000000"/>
+            </a:solidFill>
+          </a:ln>
+        </p:spPr>
+        <p:style>
+          <a:lnRef idx="0">
+            <a:scrgbClr r="0" g="0" b="0"/>
+          </a:lnRef>
+          <a:fillRef idx="0">
+            <a:scrgbClr r="0" g="0" b="0"/>
+          </a:fillRef>
+          <a:effectRef idx="0">
+            <a:scrgbClr r="0" g="0" b="0"/>
+          </a:effectRef>
+          <a:fontRef idx="minor"/>
+        </p:style>
+      </p:sp>
+      <p:sp>
+        <p:nvSpPr>
+          <p:cNvPr id="27" name="TextShape 28">
+            <a:extLst>
+              <a:ext uri="{FF2B5EF4-FFF2-40B4-BE49-F238E27FC236}">
+                <a16:creationId xmlns:a16="http://schemas.microsoft.com/office/drawing/2014/main" id="{D0C21860-38E5-4CC1-88DC-AC1D76899401}"/>
+              </a:ext>
+            </a:extLst>
+          </p:cNvPr>
+          <p:cNvSpPr txBox="1"/>
+          <p:nvPr/>
+        </p:nvSpPr>
+        <p:spPr>
+          <a:xfrm>
+            <a:off x="6418973" y="760399"/>
+            <a:ext cx="864000" cy="378360"/>
+          </a:xfrm>
+          <a:prstGeom prst="rect">
+            <a:avLst/>
+          </a:prstGeom>
+          <a:noFill/>
+          <a:ln>
+            <a:noFill/>
+          </a:ln>
+        </p:spPr>
+        <p:txBody>
+          <a:bodyPr lIns="90000" tIns="45000" rIns="90000" bIns="45000"/>
+          <a:lstStyle/>
+          <a:p>
+            <a:pPr>
+              <a:lnSpc>
+                <a:spcPct val="100000"/>
+              </a:lnSpc>
+            </a:pPr>
+            <a:r>
+              <a:rPr lang="fr-FR" sz="1400" b="0" strike="noStrike" spc="-1" dirty="0">
+                <a:latin typeface="Arial"/>
+                <a:ea typeface="Microsoft YaHei"/>
+              </a:rPr>
+              <a:t>NOTE</a:t>
+            </a:r>
+            <a:endParaRPr lang="fr-FR" sz="1400" b="0" strike="noStrike" spc="-1" dirty="0">
+              <a:latin typeface="Arial"/>
+            </a:endParaRPr>
+          </a:p>
+        </p:txBody>
+      </p:sp>
+      <p:sp>
+        <p:nvSpPr>
+          <p:cNvPr id="28" name="TextShape 29">
+            <a:extLst>
+              <a:ext uri="{FF2B5EF4-FFF2-40B4-BE49-F238E27FC236}">
+                <a16:creationId xmlns:a16="http://schemas.microsoft.com/office/drawing/2014/main" id="{9A400240-B271-4E4B-85F7-5CF7946EF0A4}"/>
+              </a:ext>
+            </a:extLst>
+          </p:cNvPr>
+          <p:cNvSpPr txBox="1"/>
+          <p:nvPr/>
+        </p:nvSpPr>
+        <p:spPr>
+          <a:xfrm>
+            <a:off x="6133853" y="1178359"/>
+            <a:ext cx="1360800" cy="602280"/>
+          </a:xfrm>
+          <a:prstGeom prst="rect">
+            <a:avLst/>
+          </a:prstGeom>
+          <a:noFill/>
+          <a:ln>
+            <a:noFill/>
+          </a:ln>
+        </p:spPr>
+        <p:txBody>
+          <a:bodyPr lIns="90000" tIns="45000" rIns="90000" bIns="45000"/>
+          <a:lstStyle/>
+          <a:p>
+            <a:pPr>
+              <a:lnSpc>
+                <a:spcPct val="100000"/>
+              </a:lnSpc>
+            </a:pPr>
+            <a:r>
+              <a:rPr lang="fr-FR" sz="1200" b="0" strike="noStrike" spc="-1" dirty="0">
+                <a:latin typeface="Arial"/>
+                <a:ea typeface="Microsoft YaHei"/>
+              </a:rPr>
+              <a:t>- Id_note : Int</a:t>
+            </a:r>
+            <a:endParaRPr lang="fr-FR" sz="1200" b="0" strike="noStrike" spc="-1" dirty="0">
+              <a:latin typeface="Arial"/>
+            </a:endParaRPr>
+          </a:p>
+          <a:p>
+            <a:pPr>
+              <a:lnSpc>
+                <a:spcPct val="100000"/>
+              </a:lnSpc>
+            </a:pPr>
+            <a:r>
+              <a:rPr lang="fr-FR" sz="1200" b="0" strike="noStrike" spc="-1" dirty="0">
+                <a:latin typeface="Arial"/>
+                <a:ea typeface="Microsoft YaHei"/>
+              </a:rPr>
+              <a:t>- Matiere : String</a:t>
+            </a:r>
+            <a:endParaRPr lang="fr-FR" sz="1200" b="0" strike="noStrike" spc="-1" dirty="0">
+              <a:latin typeface="Arial"/>
+            </a:endParaRPr>
+          </a:p>
+          <a:p>
+            <a:pPr>
+              <a:lnSpc>
+                <a:spcPct val="100000"/>
+              </a:lnSpc>
+            </a:pPr>
+            <a:r>
+              <a:rPr lang="fr-FR" sz="1200" b="0" strike="noStrike" spc="-1" dirty="0">
+                <a:latin typeface="Arial"/>
+                <a:ea typeface="Microsoft YaHei"/>
+              </a:rPr>
+              <a:t>- Note : Int</a:t>
+            </a:r>
+            <a:endParaRPr lang="fr-FR" sz="1200" b="0" strike="noStrike" spc="-1" dirty="0">
+              <a:latin typeface="Arial"/>
+            </a:endParaRPr>
+          </a:p>
+        </p:txBody>
+      </p:sp>
+      <p:sp>
+        <p:nvSpPr>
+          <p:cNvPr id="29" name="TextShape 31">
+            <a:extLst>
+              <a:ext uri="{FF2B5EF4-FFF2-40B4-BE49-F238E27FC236}">
+                <a16:creationId xmlns:a16="http://schemas.microsoft.com/office/drawing/2014/main" id="{AFC59DD5-0DD7-4366-833D-E77B5C2C74E5}"/>
+              </a:ext>
+            </a:extLst>
+          </p:cNvPr>
+          <p:cNvSpPr txBox="1"/>
+          <p:nvPr/>
+        </p:nvSpPr>
+        <p:spPr>
+          <a:xfrm>
+            <a:off x="5867068" y="5335008"/>
+            <a:ext cx="1797300" cy="431640"/>
+          </a:xfrm>
+          <a:prstGeom prst="rect">
+            <a:avLst/>
+          </a:prstGeom>
+          <a:noFill/>
+          <a:ln>
+            <a:noFill/>
+          </a:ln>
+        </p:spPr>
+        <p:txBody>
+          <a:bodyPr lIns="90000" tIns="45000" rIns="90000" bIns="45000"/>
+          <a:lstStyle/>
+          <a:p>
+            <a:r>
+              <a:rPr lang="fr-FR" sz="1200" b="0" strike="noStrike" spc="-1" dirty="0">
+                <a:latin typeface="Arial"/>
+              </a:rPr>
+              <a:t>+ Consulter_notes()</a:t>
+            </a:r>
+          </a:p>
+          <a:p>
+            <a:r>
+              <a:rPr lang="fr-FR" sz="1200" b="0" strike="noStrike" spc="-1" dirty="0">
+                <a:latin typeface="Arial"/>
+              </a:rPr>
+              <a:t>+ Consulter_profil()</a:t>
+            </a:r>
+          </a:p>
+        </p:txBody>
+      </p:sp>
+      <p:sp>
+        <p:nvSpPr>
+          <p:cNvPr id="30" name="TextShape 38">
+            <a:extLst>
+              <a:ext uri="{FF2B5EF4-FFF2-40B4-BE49-F238E27FC236}">
+                <a16:creationId xmlns:a16="http://schemas.microsoft.com/office/drawing/2014/main" id="{B5E0EB88-24A1-4B0E-A211-961F3194402E}"/>
+              </a:ext>
+            </a:extLst>
+          </p:cNvPr>
+          <p:cNvSpPr txBox="1"/>
+          <p:nvPr/>
+        </p:nvSpPr>
+        <p:spPr>
+          <a:xfrm>
+            <a:off x="3554819" y="4823641"/>
+            <a:ext cx="1619999" cy="342000"/>
+          </a:xfrm>
+          <a:prstGeom prst="rect">
+            <a:avLst/>
+          </a:prstGeom>
+          <a:noFill/>
+          <a:ln>
+            <a:noFill/>
+          </a:ln>
+        </p:spPr>
+        <p:txBody>
+          <a:bodyPr lIns="90000" tIns="45000" rIns="90000" bIns="45000"/>
+          <a:lstStyle/>
+          <a:p>
+            <a:r>
+              <a:rPr lang="fr-FR" sz="1200" b="0" strike="noStrike" spc="-1" dirty="0">
+                <a:latin typeface="Arial"/>
+              </a:rPr>
+              <a:t>+ Consulter_profil()</a:t>
+            </a:r>
+          </a:p>
+        </p:txBody>
+      </p:sp>
+      <p:sp>
+        <p:nvSpPr>
+          <p:cNvPr id="31" name="Line 39">
+            <a:extLst>
+              <a:ext uri="{FF2B5EF4-FFF2-40B4-BE49-F238E27FC236}">
+                <a16:creationId xmlns:a16="http://schemas.microsoft.com/office/drawing/2014/main" id="{1D6E80A6-DAB2-45D1-B749-1F00B0FF4F03}"/>
+              </a:ext>
+            </a:extLst>
+          </p:cNvPr>
+          <p:cNvSpPr/>
+          <p:nvPr/>
+        </p:nvSpPr>
+        <p:spPr>
+          <a:xfrm>
+            <a:off x="4005723" y="1346457"/>
+            <a:ext cx="2099689" cy="0"/>
+          </a:xfrm>
+          <a:prstGeom prst="line">
+            <a:avLst/>
+          </a:prstGeom>
+          <a:ln>
+            <a:solidFill>
+              <a:srgbClr val="000000"/>
+            </a:solidFill>
+          </a:ln>
+        </p:spPr>
+        <p:style>
+          <a:lnRef idx="0">
+            <a:scrgbClr r="0" g="0" b="0"/>
+          </a:lnRef>
+          <a:fillRef idx="0">
+            <a:scrgbClr r="0" g="0" b="0"/>
+          </a:fillRef>
+          <a:effectRef idx="0">
+            <a:scrgbClr r="0" g="0" b="0"/>
+          </a:effectRef>
+          <a:fontRef idx="minor"/>
+        </p:style>
+      </p:sp>
+      <p:sp>
+        <p:nvSpPr>
+          <p:cNvPr id="32" name="TextShape 42">
+            <a:extLst>
+              <a:ext uri="{FF2B5EF4-FFF2-40B4-BE49-F238E27FC236}">
+                <a16:creationId xmlns:a16="http://schemas.microsoft.com/office/drawing/2014/main" id="{696F0062-4E3D-4E6E-9DD4-860B85D46351}"/>
+              </a:ext>
+            </a:extLst>
+          </p:cNvPr>
+          <p:cNvSpPr txBox="1"/>
+          <p:nvPr/>
+        </p:nvSpPr>
+        <p:spPr>
+          <a:xfrm>
+            <a:off x="4617724" y="1094457"/>
+            <a:ext cx="792000" cy="306000"/>
+          </a:xfrm>
+          <a:prstGeom prst="rect">
+            <a:avLst/>
+          </a:prstGeom>
+          <a:noFill/>
+          <a:ln>
+            <a:noFill/>
+          </a:ln>
+        </p:spPr>
+        <p:txBody>
+          <a:bodyPr lIns="90000" tIns="45000" rIns="90000" bIns="45000"/>
+          <a:lstStyle/>
+          <a:p>
+            <a:r>
+              <a:rPr lang="fr-FR" sz="1200" b="0" strike="noStrike" spc="-1" dirty="0">
+                <a:latin typeface="Arial"/>
+              </a:rPr>
+              <a:t>possède</a:t>
+            </a:r>
+          </a:p>
+        </p:txBody>
+      </p:sp>
+      <p:sp>
+        <p:nvSpPr>
+          <p:cNvPr id="33" name="TextShape 24">
+            <a:extLst>
+              <a:ext uri="{FF2B5EF4-FFF2-40B4-BE49-F238E27FC236}">
+                <a16:creationId xmlns:a16="http://schemas.microsoft.com/office/drawing/2014/main" id="{7321B02B-A3E4-4DBD-88EA-8C08F7479573}"/>
+              </a:ext>
+            </a:extLst>
+          </p:cNvPr>
+          <p:cNvSpPr txBox="1"/>
+          <p:nvPr/>
+        </p:nvSpPr>
+        <p:spPr>
+          <a:xfrm>
+            <a:off x="3552294" y="5008503"/>
+            <a:ext cx="1620000" cy="724675"/>
+          </a:xfrm>
+          <a:prstGeom prst="rect">
+            <a:avLst/>
+          </a:prstGeom>
+          <a:noFill/>
+          <a:ln>
+            <a:noFill/>
+          </a:ln>
+        </p:spPr>
+        <p:txBody>
+          <a:bodyPr lIns="90000" tIns="45000" rIns="90000" bIns="45000"/>
+          <a:lstStyle/>
+          <a:p>
+            <a:r>
+              <a:rPr lang="fr-FR" sz="1200" b="0" strike="noStrike" spc="-1" dirty="0">
+                <a:latin typeface="Arial"/>
+              </a:rPr>
+              <a:t>+ Ajouter_note()</a:t>
+            </a:r>
+          </a:p>
+          <a:p>
+            <a:r>
+              <a:rPr lang="fr-FR" sz="1200" b="0" strike="noStrike" spc="-1" dirty="0">
+                <a:latin typeface="Arial"/>
+              </a:rPr>
+              <a:t>+ Modifier_note()</a:t>
+            </a:r>
+          </a:p>
+          <a:p>
+            <a:r>
+              <a:rPr lang="fr-FR" sz="1200" b="0" strike="noStrike" spc="-1" dirty="0">
+                <a:latin typeface="Arial"/>
+              </a:rPr>
+              <a:t>+ Supprimer_note()</a:t>
+            </a:r>
+          </a:p>
+        </p:txBody>
+      </p:sp>
+      <p:sp>
+        <p:nvSpPr>
+          <p:cNvPr id="34" name="TextShape 24">
+            <a:extLst>
+              <a:ext uri="{FF2B5EF4-FFF2-40B4-BE49-F238E27FC236}">
+                <a16:creationId xmlns:a16="http://schemas.microsoft.com/office/drawing/2014/main" id="{DCC784E5-F420-43C0-839F-C65774D995F0}"/>
+              </a:ext>
+            </a:extLst>
+          </p:cNvPr>
+          <p:cNvSpPr txBox="1"/>
+          <p:nvPr/>
+        </p:nvSpPr>
+        <p:spPr>
+          <a:xfrm>
+            <a:off x="1359108" y="4545904"/>
+            <a:ext cx="1620000" cy="724675"/>
+          </a:xfrm>
+          <a:prstGeom prst="rect">
+            <a:avLst/>
+          </a:prstGeom>
+          <a:noFill/>
+          <a:ln>
+            <a:noFill/>
+          </a:ln>
+        </p:spPr>
+        <p:txBody>
+          <a:bodyPr lIns="90000" tIns="45000" rIns="90000" bIns="45000"/>
+          <a:lstStyle/>
+          <a:p>
+            <a:r>
+              <a:rPr lang="fr-FR" sz="1200" b="0" strike="noStrike" spc="-1" dirty="0">
+                <a:latin typeface="Arial"/>
+              </a:rPr>
+              <a:t>+ Ajouter_note()</a:t>
+            </a:r>
+          </a:p>
+          <a:p>
+            <a:r>
+              <a:rPr lang="fr-FR" sz="1200" b="0" strike="noStrike" spc="-1" dirty="0">
+                <a:latin typeface="Arial"/>
+              </a:rPr>
+              <a:t>+ Modifier_note()</a:t>
+            </a:r>
+          </a:p>
+          <a:p>
+            <a:r>
+              <a:rPr lang="fr-FR" sz="1200" b="0" strike="noStrike" spc="-1" dirty="0">
+                <a:latin typeface="Arial"/>
+              </a:rPr>
+              <a:t>+ Supprimer_note()</a:t>
+            </a:r>
+          </a:p>
+        </p:txBody>
+      </p:sp>
+      <p:sp>
+        <p:nvSpPr>
+          <p:cNvPr id="35" name="TextShape 24">
+            <a:extLst>
+              <a:ext uri="{FF2B5EF4-FFF2-40B4-BE49-F238E27FC236}">
+                <a16:creationId xmlns:a16="http://schemas.microsoft.com/office/drawing/2014/main" id="{064AC85F-42D3-4D38-83E5-5CC16BBE51B0}"/>
+              </a:ext>
+            </a:extLst>
+          </p:cNvPr>
+          <p:cNvSpPr txBox="1"/>
+          <p:nvPr/>
+        </p:nvSpPr>
+        <p:spPr>
+          <a:xfrm>
+            <a:off x="1358388" y="5092569"/>
+            <a:ext cx="1620000" cy="724675"/>
+          </a:xfrm>
+          <a:prstGeom prst="rect">
+            <a:avLst/>
+          </a:prstGeom>
+          <a:noFill/>
+          <a:ln>
+            <a:noFill/>
+          </a:ln>
+        </p:spPr>
+        <p:txBody>
+          <a:bodyPr lIns="90000" tIns="45000" rIns="90000" bIns="45000"/>
+          <a:lstStyle/>
+          <a:p>
+            <a:r>
+              <a:rPr lang="fr-FR" sz="1200" b="0" strike="noStrike" spc="-1" dirty="0">
+                <a:latin typeface="Arial"/>
+              </a:rPr>
+              <a:t>+ Ajouter_profil()</a:t>
+            </a:r>
+          </a:p>
+          <a:p>
+            <a:r>
+              <a:rPr lang="fr-FR" sz="1200" b="0" strike="noStrike" spc="-1" dirty="0">
+                <a:latin typeface="Arial"/>
+              </a:rPr>
+              <a:t>+ Modifier_</a:t>
+            </a:r>
+            <a:r>
+              <a:rPr lang="fr-FR" sz="1200" spc="-1" dirty="0">
+                <a:latin typeface="Arial"/>
+              </a:rPr>
+              <a:t>profil</a:t>
+            </a:r>
+            <a:r>
+              <a:rPr lang="fr-FR" sz="1200" b="0" strike="noStrike" spc="-1" dirty="0">
+                <a:latin typeface="Arial"/>
+              </a:rPr>
+              <a:t>()</a:t>
+            </a:r>
+          </a:p>
+          <a:p>
+            <a:r>
+              <a:rPr lang="fr-FR" sz="1200" b="0" strike="noStrike" spc="-1" dirty="0">
+                <a:latin typeface="Arial"/>
+              </a:rPr>
+              <a:t>+ Supprimer_</a:t>
+            </a:r>
+            <a:r>
+              <a:rPr lang="fr-FR" sz="1200" spc="-1" dirty="0">
+                <a:latin typeface="Arial"/>
+              </a:rPr>
+              <a:t>profil</a:t>
+            </a:r>
+            <a:r>
+              <a:rPr lang="fr-FR" sz="1200" b="0" strike="noStrike" spc="-1" dirty="0">
+                <a:latin typeface="Arial"/>
+              </a:rPr>
+              <a:t>()</a:t>
+            </a:r>
+          </a:p>
+        </p:txBody>
+      </p:sp>
+      <p:cxnSp>
+        <p:nvCxnSpPr>
+          <p:cNvPr id="36" name="Connecteur droit 35">
+            <a:extLst>
+              <a:ext uri="{FF2B5EF4-FFF2-40B4-BE49-F238E27FC236}">
+                <a16:creationId xmlns:a16="http://schemas.microsoft.com/office/drawing/2014/main" id="{6C45664D-9E64-423E-8A60-AE2D526D9756}"/>
+              </a:ext>
+            </a:extLst>
+          </p:cNvPr>
+          <p:cNvCxnSpPr>
+            <a:cxnSpLocks/>
+          </p:cNvCxnSpPr>
+          <p:nvPr/>
+        </p:nvCxnSpPr>
+        <p:spPr>
+          <a:xfrm>
+            <a:off x="2295648" y="2376145"/>
+            <a:ext cx="4509114" cy="0"/>
+          </a:xfrm>
+          <a:prstGeom prst="line">
+            <a:avLst/>
+          </a:prstGeom>
+          <a:ln>
+            <a:solidFill>
+              <a:schemeClr val="tx1"/>
+            </a:solidFill>
+          </a:ln>
+        </p:spPr>
+        <p:style>
+          <a:lnRef idx="1">
+            <a:schemeClr val="accent1"/>
+          </a:lnRef>
+          <a:fillRef idx="0">
+            <a:schemeClr val="accent1"/>
+          </a:fillRef>
+          <a:effectRef idx="0">
+            <a:schemeClr val="accent1"/>
+          </a:effectRef>
+          <a:fontRef idx="minor">
+            <a:schemeClr val="tx1"/>
+          </a:fontRef>
+        </p:style>
+      </p:cxnSp>
+      <p:cxnSp>
+        <p:nvCxnSpPr>
+          <p:cNvPr id="37" name="Connecteur droit 36">
+            <a:extLst>
+              <a:ext uri="{FF2B5EF4-FFF2-40B4-BE49-F238E27FC236}">
+                <a16:creationId xmlns:a16="http://schemas.microsoft.com/office/drawing/2014/main" id="{BB27615E-2231-449F-B095-6E6122B73A60}"/>
+              </a:ext>
+            </a:extLst>
+          </p:cNvPr>
+          <p:cNvCxnSpPr>
+            <a:cxnSpLocks/>
+            <a:endCxn id="10" idx="0"/>
+          </p:cNvCxnSpPr>
+          <p:nvPr/>
+        </p:nvCxnSpPr>
+        <p:spPr>
+          <a:xfrm>
+            <a:off x="2295648" y="2385467"/>
+            <a:ext cx="0" cy="1357454"/>
+          </a:xfrm>
+          <a:prstGeom prst="line">
+            <a:avLst/>
+          </a:prstGeom>
+          <a:ln>
+            <a:solidFill>
+              <a:schemeClr val="tx1"/>
+            </a:solidFill>
+          </a:ln>
+        </p:spPr>
+        <p:style>
+          <a:lnRef idx="1">
+            <a:schemeClr val="accent1"/>
+          </a:lnRef>
+          <a:fillRef idx="0">
+            <a:schemeClr val="accent1"/>
+          </a:fillRef>
+          <a:effectRef idx="0">
+            <a:schemeClr val="accent1"/>
+          </a:effectRef>
+          <a:fontRef idx="minor">
+            <a:schemeClr val="tx1"/>
+          </a:fontRef>
+        </p:style>
+      </p:cxnSp>
+      <p:cxnSp>
+        <p:nvCxnSpPr>
+          <p:cNvPr id="38" name="Connecteur droit 37">
+            <a:extLst>
+              <a:ext uri="{FF2B5EF4-FFF2-40B4-BE49-F238E27FC236}">
+                <a16:creationId xmlns:a16="http://schemas.microsoft.com/office/drawing/2014/main" id="{DD0E7719-97B9-4309-B3E8-C408918FE3E2}"/>
+              </a:ext>
+            </a:extLst>
+          </p:cNvPr>
+          <p:cNvCxnSpPr>
+            <a:cxnSpLocks/>
+            <a:endCxn id="7" idx="0"/>
+          </p:cNvCxnSpPr>
+          <p:nvPr/>
+        </p:nvCxnSpPr>
+        <p:spPr>
+          <a:xfrm>
+            <a:off x="4524707" y="2385467"/>
+            <a:ext cx="0" cy="1357454"/>
+          </a:xfrm>
+          <a:prstGeom prst="line">
+            <a:avLst/>
+          </a:prstGeom>
+          <a:ln>
+            <a:solidFill>
+              <a:schemeClr val="tx1"/>
+            </a:solidFill>
+          </a:ln>
+        </p:spPr>
+        <p:style>
+          <a:lnRef idx="1">
+            <a:schemeClr val="accent1"/>
+          </a:lnRef>
+          <a:fillRef idx="0">
+            <a:schemeClr val="accent1"/>
+          </a:fillRef>
+          <a:effectRef idx="0">
+            <a:schemeClr val="accent1"/>
+          </a:effectRef>
+          <a:fontRef idx="minor">
+            <a:schemeClr val="tx1"/>
+          </a:fontRef>
+        </p:style>
+      </p:cxnSp>
+      <p:cxnSp>
+        <p:nvCxnSpPr>
+          <p:cNvPr id="39" name="Connecteur droit 38">
+            <a:extLst>
+              <a:ext uri="{FF2B5EF4-FFF2-40B4-BE49-F238E27FC236}">
+                <a16:creationId xmlns:a16="http://schemas.microsoft.com/office/drawing/2014/main" id="{657DC3C2-789C-4E71-85DC-DD3DFA7E7A58}"/>
+              </a:ext>
+            </a:extLst>
+          </p:cNvPr>
+          <p:cNvCxnSpPr>
+            <a:cxnSpLocks/>
+            <a:endCxn id="4" idx="0"/>
+          </p:cNvCxnSpPr>
+          <p:nvPr/>
+        </p:nvCxnSpPr>
+        <p:spPr>
+          <a:xfrm>
+            <a:off x="6804762" y="2385467"/>
+            <a:ext cx="0" cy="1367601"/>
+          </a:xfrm>
+          <a:prstGeom prst="line">
+            <a:avLst/>
+          </a:prstGeom>
+          <a:ln>
+            <a:solidFill>
+              <a:schemeClr val="tx1"/>
+            </a:solidFill>
+          </a:ln>
+        </p:spPr>
+        <p:style>
+          <a:lnRef idx="1">
+            <a:schemeClr val="accent1"/>
+          </a:lnRef>
+          <a:fillRef idx="0">
+            <a:schemeClr val="accent1"/>
+          </a:fillRef>
+          <a:effectRef idx="0">
+            <a:schemeClr val="accent1"/>
+          </a:effectRef>
+          <a:fontRef idx="minor">
+            <a:schemeClr val="tx1"/>
+          </a:fontRef>
+        </p:style>
+      </p:cxnSp>
+      <p:cxnSp>
+        <p:nvCxnSpPr>
+          <p:cNvPr id="40" name="Connecteur droit avec flèche 39">
+            <a:extLst>
+              <a:ext uri="{FF2B5EF4-FFF2-40B4-BE49-F238E27FC236}">
+                <a16:creationId xmlns:a16="http://schemas.microsoft.com/office/drawing/2014/main" id="{6489C979-8575-4584-B1C4-42BC8B797F82}"/>
+              </a:ext>
+            </a:extLst>
+          </p:cNvPr>
+          <p:cNvCxnSpPr>
+            <a:cxnSpLocks/>
+            <a:endCxn id="19" idx="2"/>
+          </p:cNvCxnSpPr>
+          <p:nvPr/>
+        </p:nvCxnSpPr>
+        <p:spPr>
+          <a:xfrm flipV="1">
+            <a:off x="2960764" y="1969256"/>
+            <a:ext cx="0" cy="391651"/>
+          </a:xfrm>
+          <a:prstGeom prst="straightConnector1">
+            <a:avLst/>
+          </a:prstGeom>
+          <a:ln>
+            <a:solidFill>
+              <a:schemeClr val="tx1"/>
+            </a:solidFill>
+            <a:tailEnd type="triangle" w="lg" len="lg"/>
+          </a:ln>
+        </p:spPr>
+        <p:style>
+          <a:lnRef idx="1">
+            <a:schemeClr val="accent1"/>
+          </a:lnRef>
+          <a:fillRef idx="0">
+            <a:schemeClr val="accent1"/>
+          </a:fillRef>
+          <a:effectRef idx="0">
+            <a:schemeClr val="accent1"/>
+          </a:effectRef>
+          <a:fontRef idx="minor">
+            <a:schemeClr val="tx1"/>
+          </a:fontRef>
+        </p:style>
+      </p:cxnSp>
+    </p:spTree>
+    <p:extLst>
+      <p:ext uri="{BB962C8B-B14F-4D97-AF65-F5344CB8AC3E}">
+        <p14:creationId xmlns:p14="http://schemas.microsoft.com/office/powerpoint/2010/main" val="153285146"/>
+      </p:ext>
+    </p:extLst>
+  </p:cSld>
+  <p:clrMapOvr>
+    <a:masterClrMapping/>
+  </p:clrMapOvr>
+</p:sld>
+</file>
+
 <file path=ppt/theme/theme1.xml><?xml version="1.0" encoding="utf-8"?>
 <a:theme xmlns:a="http://schemas.openxmlformats.org/drawingml/2006/main" name="Thème Office">
   <a:themeElements>

</xml_diff>